<commit_message>
created 3 month rolling mean traansport
</commit_message>
<xml_diff>
--- a/Thermo_Group_Project.pptx
+++ b/Thermo_Group_Project.pptx
@@ -22,11 +22,11 @@
     <p:sldId id="256" r:id="rId10"/>
     <p:sldId id="263" r:id="rId11"/>
     <p:sldId id="267" r:id="rId12"/>
-    <p:sldId id="264" r:id="rId13"/>
-    <p:sldId id="266" r:id="rId14"/>
-    <p:sldId id="265" r:id="rId15"/>
+    <p:sldId id="266" r:id="rId13"/>
+    <p:sldId id="265" r:id="rId14"/>
+    <p:sldId id="268" r:id="rId15"/>
   </p:sldIdLst>
-  <p:sldSz cx="9144000" cy="6858000"/>
+  <p:sldSz cx="9144000" cy="6858000" type="screen4x3"/>
   <p:notesSz cx="7559675" cy="10691813"/>
   <p:defaultTextStyle>
     <a:defPPr>
@@ -1284,7 +1284,7 @@
     </p:spTree>
     <p:extLst>
       <p:ext uri="{BB962C8B-B14F-4D97-AF65-F5344CB8AC3E}">
-        <p14:creationId xmlns:p14="http://schemas.microsoft.com/office/powerpoint/2010/main" val="2700880944"/>
+        <p14:creationId xmlns:p14="http://schemas.microsoft.com/office/powerpoint/2010/main" val="3489413672"/>
       </p:ext>
     </p:extLst>
   </p:cSld>
@@ -1404,7 +1404,7 @@
     </p:spTree>
     <p:extLst>
       <p:ext uri="{BB962C8B-B14F-4D97-AF65-F5344CB8AC3E}">
-        <p14:creationId xmlns:p14="http://schemas.microsoft.com/office/powerpoint/2010/main" val="3489413672"/>
+        <p14:creationId xmlns:p14="http://schemas.microsoft.com/office/powerpoint/2010/main" val="1496270079"/>
       </p:ext>
     </p:extLst>
   </p:cSld>
@@ -1524,7 +1524,7 @@
     </p:spTree>
     <p:extLst>
       <p:ext uri="{BB962C8B-B14F-4D97-AF65-F5344CB8AC3E}">
-        <p14:creationId xmlns:p14="http://schemas.microsoft.com/office/powerpoint/2010/main" val="1496270079"/>
+        <p14:creationId xmlns:p14="http://schemas.microsoft.com/office/powerpoint/2010/main" val="2177311580"/>
       </p:ext>
     </p:extLst>
   </p:cSld>
@@ -26091,8 +26091,8 @@
         </p:nvSpPr>
         <p:spPr>
           <a:xfrm>
-            <a:off x="611280" y="2060639"/>
-            <a:ext cx="7921440" cy="2196000"/>
+            <a:off x="611280" y="1008668"/>
+            <a:ext cx="7921440" cy="3247971"/>
           </a:xfrm>
         </p:spPr>
         <p:txBody>
@@ -26100,6 +26100,20 @@
           <a:lstStyle/>
           <a:p>
             <a:pPr lvl="0" algn="ctr"/>
+            <a:r>
+              <a:rPr lang="en-GB" sz="4000" b="1" dirty="0"/>
+              <a:t>New estimates of the strength and variability of the </a:t>
+            </a:r>
+            <a:br>
+              <a:rPr lang="en-GB" sz="4000" b="1" dirty="0"/>
+            </a:br>
+            <a:r>
+              <a:rPr lang="en-GB" sz="4000" b="1" dirty="0"/>
+              <a:t>AMOC at 11°S</a:t>
+            </a:r>
+            <a:br>
+              <a:rPr lang="en-GB" sz="4000" dirty="0"/>
+            </a:br>
             <a:br>
               <a:rPr lang="de-DE" sz="4000" dirty="0"/>
             </a:br>
@@ -26123,12 +26137,6 @@
               <a:rPr lang="de-DE" sz="2000" dirty="0"/>
               <a:t>Feb 10, 2022</a:t>
             </a:r>
-            <a:br>
-              <a:rPr lang="de-DE" sz="2000" dirty="0"/>
-            </a:br>
-            <a:br>
-              <a:rPr lang="de-DE" sz="2000" dirty="0"/>
-            </a:br>
             <a:br>
               <a:rPr lang="de-DE" sz="2000" dirty="0"/>
             </a:br>
@@ -26686,7 +26694,7 @@
         <p:spPr bwMode="auto">
           <a:xfrm>
             <a:off x="273908" y="1462282"/>
-            <a:ext cx="5738091" cy="4962280"/>
+            <a:ext cx="6528969" cy="4962280"/>
           </a:xfrm>
           <a:prstGeom prst="rect">
             <a:avLst/>
@@ -26898,7 +26906,7 @@
                   <a:schemeClr val="tx1"/>
                 </a:solidFill>
               </a:rPr>
-              <a:t>Monthly mean for Western Boundary Transport</a:t>
+              <a:t>Monthly mean for Western Boundary Transport (also standard deviation)</a:t>
             </a:r>
           </a:p>
           <a:p>
@@ -26908,7 +26916,14 @@
             </a:pPr>
             <a:r>
               <a:rPr lang="en-US" sz="2400" dirty="0"/>
-              <a:t>Interior : Sum of variability + mean value (group 1 + group 2)</a:t>
+              <a:t>Interior : Mean value + variability </a:t>
+            </a:r>
+            <a:br>
+              <a:rPr lang="en-US" sz="2400" dirty="0"/>
+            </a:br>
+            <a:r>
+              <a:rPr lang="en-US" sz="2400" dirty="0"/>
+              <a:t>(group 1 + group 2)</a:t>
             </a:r>
             <a:r>
               <a:rPr lang="en-US" sz="2400" dirty="0">
@@ -27490,258 +27505,12 @@
           </a:p>
         </p:txBody>
       </p:sp>
-    </p:spTree>
-    <p:extLst>
-      <p:ext uri="{BB962C8B-B14F-4D97-AF65-F5344CB8AC3E}">
-        <p14:creationId xmlns:p14="http://schemas.microsoft.com/office/powerpoint/2010/main" val="3161792258"/>
-      </p:ext>
-    </p:extLst>
-  </p:cSld>
-  <p:clrMapOvr>
-    <a:masterClrMapping/>
-  </p:clrMapOvr>
-  <p:timing>
-    <p:tnLst>
-      <p:par>
-        <p:cTn id="1" dur="indefinite" restart="never" nodeType="tmRoot">
-          <p:childTnLst>
-            <p:seq concurrent="1" nextAc="seek">
-              <p:cTn id="2" dur="indefinite" nodeType="mainSeq">
-                <p:childTnLst>
-                  <p:par>
-                    <p:cTn id="3" fill="hold">
-                      <p:stCondLst>
-                        <p:cond delay="indefinite"/>
-                      </p:stCondLst>
-                      <p:childTnLst>
-                        <p:par>
-                          <p:cTn id="4" fill="hold">
-                            <p:stCondLst>
-                              <p:cond delay="0"/>
-                            </p:stCondLst>
-                            <p:childTnLst>
-                              <p:par>
-                                <p:cTn id="5" presetID="1" presetClass="entr" presetSubtype="0" fill="hold" grpId="0" nodeType="clickEffect">
-                                  <p:stCondLst>
-                                    <p:cond delay="0"/>
-                                  </p:stCondLst>
-                                  <p:childTnLst>
-                                    <p:set>
-                                      <p:cBhvr>
-                                        <p:cTn id="6" dur="1" fill="hold">
-                                          <p:stCondLst>
-                                            <p:cond delay="0"/>
-                                          </p:stCondLst>
-                                        </p:cTn>
-                                        <p:tgtEl>
-                                          <p:spTgt spid="5"/>
-                                        </p:tgtEl>
-                                        <p:attrNameLst>
-                                          <p:attrName>style.visibility</p:attrName>
-                                        </p:attrNameLst>
-                                      </p:cBhvr>
-                                      <p:to>
-                                        <p:strVal val="visible"/>
-                                      </p:to>
-                                    </p:set>
-                                  </p:childTnLst>
-                                </p:cTn>
-                              </p:par>
-                            </p:childTnLst>
-                          </p:cTn>
-                        </p:par>
-                      </p:childTnLst>
-                    </p:cTn>
-                  </p:par>
-                </p:childTnLst>
-              </p:cTn>
-              <p:prevCondLst>
-                <p:cond evt="onPrev" delay="0">
-                  <p:tgtEl>
-                    <p:sldTgt/>
-                  </p:tgtEl>
-                </p:cond>
-              </p:prevCondLst>
-              <p:nextCondLst>
-                <p:cond evt="onNext" delay="0">
-                  <p:tgtEl>
-                    <p:sldTgt/>
-                  </p:tgtEl>
-                </p:cond>
-              </p:nextCondLst>
-            </p:seq>
-          </p:childTnLst>
-        </p:cTn>
-      </p:par>
-    </p:tnLst>
-    <p:bldLst>
-      <p:bldP spid="5" grpId="0" animBg="1"/>
-    </p:bldLst>
-  </p:timing>
-</p:sld>
-</file>
-
-<file path=ppt/slides/slide4.xml><?xml version="1.0" encoding="utf-8"?>
-<p:sld xmlns:a="http://schemas.openxmlformats.org/drawingml/2006/main" xmlns:r="http://schemas.openxmlformats.org/officeDocument/2006/relationships" xmlns:p="http://schemas.openxmlformats.org/presentationml/2006/main">
-  <p:cSld>
-    <p:spTree>
-      <p:nvGrpSpPr>
-        <p:cNvPr id="1" name=""/>
-        <p:cNvGrpSpPr/>
-        <p:nvPr/>
-      </p:nvGrpSpPr>
-      <p:grpSpPr>
-        <a:xfrm>
-          <a:off x="0" y="0"/>
-          <a:ext cx="0" cy="0"/>
-          <a:chOff x="0" y="0"/>
-          <a:chExt cx="0" cy="0"/>
-        </a:xfrm>
-      </p:grpSpPr>
-      <p:sp>
-        <p:nvSpPr>
-          <p:cNvPr id="2" name="Fußzeilenplatzhalter 3">
-            <a:extLst>
-              <a:ext uri="{FF2B5EF4-FFF2-40B4-BE49-F238E27FC236}">
-                <a16:creationId xmlns:a16="http://schemas.microsoft.com/office/drawing/2014/main" id="{51B3B9ED-333A-49DF-A34F-CA68D6DE663D}"/>
-              </a:ext>
-            </a:extLst>
-          </p:cNvPr>
-          <p:cNvSpPr txBox="1">
-            <a:spLocks noGrp="1"/>
-          </p:cNvSpPr>
-          <p:nvPr>
-            <p:ph type="ftr" sz="quarter" idx="9"/>
-          </p:nvPr>
-        </p:nvSpPr>
-        <p:spPr>
-          <a:xfrm>
-            <a:off x="611280" y="6424562"/>
-            <a:ext cx="5400720" cy="433079"/>
-          </a:xfrm>
-          <a:prstGeom prst="rect">
-            <a:avLst/>
-          </a:prstGeom>
-          <a:noFill/>
-          <a:ln>
-            <a:noFill/>
-          </a:ln>
-        </p:spPr>
-        <p:txBody>
-          <a:bodyPr wrap="square" lIns="0" tIns="0" rIns="0" bIns="0" anchor="t" anchorCtr="0">
-            <a:noAutofit/>
-          </a:bodyPr>
-          <a:lstStyle/>
-          <a:p>
-            <a:pPr lvl="0" hangingPunct="0"/>
-            <a:r>
-              <a:rPr lang="de-DE" sz="1200" dirty="0">
-                <a:solidFill>
-                  <a:srgbClr val="808080"/>
-                </a:solidFill>
-                <a:latin typeface="Arial"/>
-                <a:cs typeface="Arial"/>
-              </a:rPr>
-              <a:t>Total Transport | Feb 10, 2022</a:t>
-            </a:r>
-          </a:p>
-        </p:txBody>
-      </p:sp>
-      <p:sp>
-        <p:nvSpPr>
-          <p:cNvPr id="3" name="Textplatzhalter 9">
-            <a:extLst>
-              <a:ext uri="{FF2B5EF4-FFF2-40B4-BE49-F238E27FC236}">
-                <a16:creationId xmlns:a16="http://schemas.microsoft.com/office/drawing/2014/main" id="{604C2E9C-9F98-4E6E-8B7F-A5FE12BFB48B}"/>
-              </a:ext>
-            </a:extLst>
-          </p:cNvPr>
-          <p:cNvSpPr txBox="1">
-            <a:spLocks noGrp="1"/>
-          </p:cNvSpPr>
-          <p:nvPr>
-            <p:ph type="body" idx="4294967295"/>
-          </p:nvPr>
-        </p:nvSpPr>
-        <p:spPr>
-          <a:xfrm>
-            <a:off x="273909" y="230166"/>
-            <a:ext cx="5365750" cy="871537"/>
-          </a:xfrm>
-        </p:spPr>
-        <p:txBody>
-          <a:bodyPr anchor="b"/>
-          <a:lstStyle/>
-          <a:p>
-            <a:pPr lvl="0"/>
-            <a:r>
-              <a:rPr lang="de-DE" sz="2400" b="1" dirty="0" err="1"/>
-              <a:t>Timeseries</a:t>
-            </a:r>
-            <a:r>
-              <a:rPr lang="de-DE" sz="2400" b="1" dirty="0"/>
-              <a:t> and </a:t>
-            </a:r>
-            <a:r>
-              <a:rPr lang="de-DE" sz="2400" b="1" dirty="0" err="1"/>
-              <a:t>Seasonal</a:t>
-            </a:r>
-            <a:r>
-              <a:rPr lang="de-DE" sz="2400" b="1" dirty="0"/>
-              <a:t> </a:t>
-            </a:r>
-            <a:r>
-              <a:rPr lang="de-DE" sz="2400" b="1" dirty="0" err="1"/>
-              <a:t>cycle</a:t>
-            </a:r>
-            <a:endParaRPr lang="de-DE" sz="2400" b="1" dirty="0"/>
-          </a:p>
-        </p:txBody>
-      </p:sp>
-      <p:sp>
-        <p:nvSpPr>
-          <p:cNvPr id="4" name="Textfeld 3">
-            <a:extLst>
-              <a:ext uri="{FF2B5EF4-FFF2-40B4-BE49-F238E27FC236}">
-                <a16:creationId xmlns:a16="http://schemas.microsoft.com/office/drawing/2014/main" id="{FB4052EA-F220-4238-A0A9-D7286F599256}"/>
-              </a:ext>
-            </a:extLst>
-          </p:cNvPr>
-          <p:cNvSpPr txBox="1"/>
-          <p:nvPr/>
-        </p:nvSpPr>
-        <p:spPr>
-          <a:xfrm>
-            <a:off x="4492800" y="3319199"/>
-            <a:ext cx="2059200" cy="1792800"/>
-          </a:xfrm>
-          <a:prstGeom prst="rect">
-            <a:avLst/>
-          </a:prstGeom>
-          <a:noFill/>
-          <a:ln>
-            <a:noFill/>
-          </a:ln>
-        </p:spPr>
-        <p:txBody>
-          <a:bodyPr wrap="none" lIns="90000" tIns="45000" rIns="90000" bIns="45000" anchorCtr="0" compatLnSpc="0"/>
-          <a:lstStyle/>
-          <a:p>
-            <a:pPr hangingPunct="0"/>
-            <a:endParaRPr lang="de-DE">
-              <a:latin typeface="Liberation Sans" pitchFamily="18"/>
-              <a:ea typeface="Noto Sans CJK SC" pitchFamily="2"/>
-              <a:cs typeface="Lohit Devanagari" pitchFamily="2"/>
-            </a:endParaRPr>
-          </a:p>
-        </p:txBody>
-      </p:sp>
-      <p:sp>
-        <p:nvSpPr>
-          <p:cNvPr id="11" name="Inhaltsplatzhalter 1">
-            <a:extLst>
-              <a:ext uri="{FF2B5EF4-FFF2-40B4-BE49-F238E27FC236}">
-                <a16:creationId xmlns:a16="http://schemas.microsoft.com/office/drawing/2014/main" id="{055A2961-BFD6-D74B-B97C-4801602AF751}"/>
+      <p:sp>
+        <p:nvSpPr>
+          <p:cNvPr id="8" name="Inhaltsplatzhalter 1">
+            <a:extLst>
+              <a:ext uri="{FF2B5EF4-FFF2-40B4-BE49-F238E27FC236}">
+                <a16:creationId xmlns:a16="http://schemas.microsoft.com/office/drawing/2014/main" id="{AB29750F-FE33-4E2D-9C16-34BA70D70800}"/>
               </a:ext>
             </a:extLst>
           </p:cNvPr>
@@ -27752,8 +27521,8 @@
         </p:nvSpPr>
         <p:spPr bwMode="auto">
           <a:xfrm>
-            <a:off x="255586" y="5335022"/>
-            <a:ext cx="8870092" cy="820682"/>
+            <a:off x="273908" y="5152861"/>
+            <a:ext cx="8870092" cy="1040805"/>
           </a:xfrm>
           <a:prstGeom prst="rect">
             <a:avLst/>
@@ -27765,14 +27534,14 @@
           <a:effectLst/>
           <a:extLst>
             <a:ext uri="{909E8E84-426E-40dd-AFC4-6F175D3DCCD1}">
-              <a14:hiddenFill xmlns:a14="http://schemas.microsoft.com/office/drawing/2010/main" xmlns="" xmlns:lc="http://schemas.openxmlformats.org/drawingml/2006/lockedCanvas">
+              <a14:hiddenFill xmlns:lc="http://schemas.openxmlformats.org/drawingml/2006/lockedCanvas" xmlns="" xmlns:a14="http://schemas.microsoft.com/office/drawing/2010/main">
                 <a:solidFill>
                   <a:schemeClr val="accent1"/>
                 </a:solidFill>
               </a14:hiddenFill>
             </a:ext>
             <a:ext uri="{91240B29-F687-4f45-9708-019B960494DF}">
-              <a14:hiddenLine xmlns:a14="http://schemas.microsoft.com/office/drawing/2010/main" xmlns="" xmlns:lc="http://schemas.openxmlformats.org/drawingml/2006/lockedCanvas" w="9525">
+              <a14:hiddenLine xmlns:lc="http://schemas.openxmlformats.org/drawingml/2006/lockedCanvas" xmlns="" xmlns:a14="http://schemas.microsoft.com/office/drawing/2010/main" w="9525">
                 <a:solidFill>
                   <a:schemeClr val="tx1"/>
                 </a:solidFill>
@@ -27782,7 +27551,7 @@
               </a14:hiddenLine>
             </a:ext>
             <a:ext uri="{AF507438-7753-43e0-B8FC-AC1667EBCBE1}">
-              <a14:hiddenEffects xmlns:a14="http://schemas.microsoft.com/office/drawing/2010/main" xmlns="" xmlns:lc="http://schemas.openxmlformats.org/drawingml/2006/lockedCanvas">
+              <a14:hiddenEffects xmlns:lc="http://schemas.openxmlformats.org/drawingml/2006/lockedCanvas" xmlns="" xmlns:a14="http://schemas.microsoft.com/office/drawing/2010/main">
                 <a:effectLst>
                   <a:outerShdw dist="35921" dir="2700000" algn="ctr" rotWithShape="0">
                     <a:schemeClr val="bg2"/>
@@ -27953,58 +27722,306 @@
               <a:buFont typeface="Arial" panose="020B0604020202020204" pitchFamily="34" charset="0"/>
               <a:buChar char="•"/>
             </a:pPr>
-            <a:endParaRPr lang="en-US" sz="2000" b="1" dirty="0">
-              <a:solidFill>
-                <a:srgbClr val="005AA0"/>
-              </a:solidFill>
-            </a:endParaRPr>
-          </a:p>
-        </p:txBody>
-      </p:sp>
-      <p:pic>
-        <p:nvPicPr>
-          <p:cNvPr id="13" name="Grafik 12">
-            <a:extLst>
-              <a:ext uri="{FF2B5EF4-FFF2-40B4-BE49-F238E27FC236}">
-                <a16:creationId xmlns:a16="http://schemas.microsoft.com/office/drawing/2014/main" id="{5CFBC320-F5EE-4481-8222-803AAA676D7B}"/>
-              </a:ext>
-            </a:extLst>
-          </p:cNvPr>
-          <p:cNvPicPr>
-            <a:picLocks noChangeAspect="1"/>
-          </p:cNvPicPr>
-          <p:nvPr/>
-        </p:nvPicPr>
-        <p:blipFill>
-          <a:blip r:embed="rId3">
-            <a:extLst>
-              <a:ext uri="{28A0092B-C50C-407E-A947-70E740481C1C}">
-                <a14:useLocalDpi xmlns:a14="http://schemas.microsoft.com/office/drawing/2010/main" val="0"/>
-              </a:ext>
-              <a:ext uri="{96DAC541-7B7A-43D3-8B79-37D633B846F1}">
-                <asvg:svgBlip xmlns:asvg="http://schemas.microsoft.com/office/drawing/2016/SVG/main" r:embed="rId4"/>
-              </a:ext>
-            </a:extLst>
-          </a:blip>
-          <a:srcRect l="6157" r="6157"/>
-          <a:stretch/>
-        </p:blipFill>
+            <a:r>
+              <a:rPr lang="en-US" sz="2000" dirty="0">
+                <a:solidFill>
+                  <a:schemeClr val="tx1"/>
+                </a:solidFill>
+              </a:rPr>
+              <a:t>Total Transport northwards</a:t>
+            </a:r>
+          </a:p>
+          <a:p>
+            <a:pPr marL="342900" indent="-342900">
+              <a:spcBef>
+                <a:spcPts val="600"/>
+              </a:spcBef>
+              <a:buFont typeface="Arial" panose="020B0604020202020204" pitchFamily="34" charset="0"/>
+              <a:buChar char="•"/>
+            </a:pPr>
+            <a:r>
+              <a:rPr lang="en-US" sz="2000" dirty="0"/>
+              <a:t>No seasonal cycle visible </a:t>
+            </a:r>
+            <a:r>
+              <a:rPr lang="en-US" sz="2000" dirty="0">
+                <a:sym typeface="Wingdings" panose="05000000000000000000" pitchFamily="2" charset="2"/>
+              </a:rPr>
+              <a:t>&lt;-- by Western Boundary Transport</a:t>
+            </a:r>
+            <a:endParaRPr lang="en-US" sz="2000" dirty="0"/>
+          </a:p>
+          <a:p>
+            <a:pPr marL="342900" indent="-342900">
+              <a:spcBef>
+                <a:spcPts val="600"/>
+              </a:spcBef>
+              <a:buFont typeface="Arial" panose="020B0604020202020204" pitchFamily="34" charset="0"/>
+              <a:buChar char="•"/>
+            </a:pPr>
+            <a:r>
+              <a:rPr lang="en-US" sz="2000" b="1" dirty="0">
+                <a:solidFill>
+                  <a:srgbClr val="005AA0"/>
+                </a:solidFill>
+              </a:rPr>
+              <a:t>Strong intra-annual variability in Total Transport --&gt; Smooth timeseries</a:t>
+            </a:r>
+          </a:p>
+        </p:txBody>
+      </p:sp>
+    </p:spTree>
+    <p:extLst>
+      <p:ext uri="{BB962C8B-B14F-4D97-AF65-F5344CB8AC3E}">
+        <p14:creationId xmlns:p14="http://schemas.microsoft.com/office/powerpoint/2010/main" val="3161792258"/>
+      </p:ext>
+    </p:extLst>
+  </p:cSld>
+  <p:clrMapOvr>
+    <a:masterClrMapping/>
+  </p:clrMapOvr>
+  <p:timing>
+    <p:tnLst>
+      <p:par>
+        <p:cTn id="1" dur="indefinite" restart="never" nodeType="tmRoot">
+          <p:childTnLst>
+            <p:seq concurrent="1" nextAc="seek">
+              <p:cTn id="2" dur="indefinite" nodeType="mainSeq">
+                <p:childTnLst>
+                  <p:par>
+                    <p:cTn id="3" fill="hold">
+                      <p:stCondLst>
+                        <p:cond delay="indefinite"/>
+                      </p:stCondLst>
+                      <p:childTnLst>
+                        <p:par>
+                          <p:cTn id="4" fill="hold">
+                            <p:stCondLst>
+                              <p:cond delay="0"/>
+                            </p:stCondLst>
+                            <p:childTnLst>
+                              <p:par>
+                                <p:cTn id="5" presetID="1" presetClass="entr" presetSubtype="0" fill="hold" grpId="0" nodeType="clickEffect">
+                                  <p:stCondLst>
+                                    <p:cond delay="0"/>
+                                  </p:stCondLst>
+                                  <p:childTnLst>
+                                    <p:set>
+                                      <p:cBhvr>
+                                        <p:cTn id="6" dur="1" fill="hold">
+                                          <p:stCondLst>
+                                            <p:cond delay="0"/>
+                                          </p:stCondLst>
+                                        </p:cTn>
+                                        <p:tgtEl>
+                                          <p:spTgt spid="5"/>
+                                        </p:tgtEl>
+                                        <p:attrNameLst>
+                                          <p:attrName>style.visibility</p:attrName>
+                                        </p:attrNameLst>
+                                      </p:cBhvr>
+                                      <p:to>
+                                        <p:strVal val="visible"/>
+                                      </p:to>
+                                    </p:set>
+                                  </p:childTnLst>
+                                </p:cTn>
+                              </p:par>
+                            </p:childTnLst>
+                          </p:cTn>
+                        </p:par>
+                      </p:childTnLst>
+                    </p:cTn>
+                  </p:par>
+                </p:childTnLst>
+              </p:cTn>
+              <p:prevCondLst>
+                <p:cond evt="onPrev" delay="0">
+                  <p:tgtEl>
+                    <p:sldTgt/>
+                  </p:tgtEl>
+                </p:cond>
+              </p:prevCondLst>
+              <p:nextCondLst>
+                <p:cond evt="onNext" delay="0">
+                  <p:tgtEl>
+                    <p:sldTgt/>
+                  </p:tgtEl>
+                </p:cond>
+              </p:nextCondLst>
+            </p:seq>
+          </p:childTnLst>
+        </p:cTn>
+      </p:par>
+    </p:tnLst>
+    <p:bldLst>
+      <p:bldP spid="5" grpId="0" animBg="1"/>
+    </p:bldLst>
+  </p:timing>
+</p:sld>
+</file>
+
+<file path=ppt/slides/slide4.xml><?xml version="1.0" encoding="utf-8"?>
+<p:sld xmlns:a="http://schemas.openxmlformats.org/drawingml/2006/main" xmlns:r="http://schemas.openxmlformats.org/officeDocument/2006/relationships" xmlns:p="http://schemas.openxmlformats.org/presentationml/2006/main">
+  <p:cSld>
+    <p:spTree>
+      <p:nvGrpSpPr>
+        <p:cNvPr id="1" name=""/>
+        <p:cNvGrpSpPr/>
+        <p:nvPr/>
+      </p:nvGrpSpPr>
+      <p:grpSpPr>
+        <a:xfrm>
+          <a:off x="0" y="0"/>
+          <a:ext cx="0" cy="0"/>
+          <a:chOff x="0" y="0"/>
+          <a:chExt cx="0" cy="0"/>
+        </a:xfrm>
+      </p:grpSpPr>
+      <p:sp>
+        <p:nvSpPr>
+          <p:cNvPr id="2" name="Fußzeilenplatzhalter 3">
+            <a:extLst>
+              <a:ext uri="{FF2B5EF4-FFF2-40B4-BE49-F238E27FC236}">
+                <a16:creationId xmlns:a16="http://schemas.microsoft.com/office/drawing/2014/main" id="{51B3B9ED-333A-49DF-A34F-CA68D6DE663D}"/>
+              </a:ext>
+            </a:extLst>
+          </p:cNvPr>
+          <p:cNvSpPr txBox="1">
+            <a:spLocks noGrp="1"/>
+          </p:cNvSpPr>
+          <p:nvPr>
+            <p:ph type="ftr" sz="quarter" idx="9"/>
+          </p:nvPr>
+        </p:nvSpPr>
         <p:spPr>
           <a:xfrm>
-            <a:off x="0" y="1477651"/>
-            <a:ext cx="9125678" cy="3902697"/>
+            <a:off x="611280" y="6424562"/>
+            <a:ext cx="5400720" cy="433079"/>
           </a:xfrm>
           <a:prstGeom prst="rect">
             <a:avLst/>
           </a:prstGeom>
+          <a:noFill/>
+          <a:ln>
+            <a:noFill/>
+          </a:ln>
         </p:spPr>
-      </p:pic>
-      <p:sp>
-        <p:nvSpPr>
-          <p:cNvPr id="7" name="Inhaltsplatzhalter 1">
-            <a:extLst>
-              <a:ext uri="{FF2B5EF4-FFF2-40B4-BE49-F238E27FC236}">
-                <a16:creationId xmlns:a16="http://schemas.microsoft.com/office/drawing/2014/main" id="{37751B6E-7F27-493D-8FB5-72F8A220C4AB}"/>
+        <p:txBody>
+          <a:bodyPr wrap="square" lIns="0" tIns="0" rIns="0" bIns="0" anchor="t" anchorCtr="0">
+            <a:noAutofit/>
+          </a:bodyPr>
+          <a:lstStyle/>
+          <a:p>
+            <a:pPr lvl="0" hangingPunct="0"/>
+            <a:r>
+              <a:rPr lang="de-DE" sz="1200" dirty="0">
+                <a:solidFill>
+                  <a:srgbClr val="808080"/>
+                </a:solidFill>
+                <a:latin typeface="Arial"/>
+                <a:cs typeface="Arial"/>
+              </a:rPr>
+              <a:t>Total Transport | Feb 10, 2022</a:t>
+            </a:r>
+          </a:p>
+        </p:txBody>
+      </p:sp>
+      <p:sp>
+        <p:nvSpPr>
+          <p:cNvPr id="3" name="Textplatzhalter 9">
+            <a:extLst>
+              <a:ext uri="{FF2B5EF4-FFF2-40B4-BE49-F238E27FC236}">
+                <a16:creationId xmlns:a16="http://schemas.microsoft.com/office/drawing/2014/main" id="{604C2E9C-9F98-4E6E-8B7F-A5FE12BFB48B}"/>
+              </a:ext>
+            </a:extLst>
+          </p:cNvPr>
+          <p:cNvSpPr txBox="1">
+            <a:spLocks noGrp="1"/>
+          </p:cNvSpPr>
+          <p:nvPr>
+            <p:ph type="body" idx="4294967295"/>
+          </p:nvPr>
+        </p:nvSpPr>
+        <p:spPr>
+          <a:xfrm>
+            <a:off x="273909" y="230166"/>
+            <a:ext cx="5365750" cy="871537"/>
+          </a:xfrm>
+        </p:spPr>
+        <p:txBody>
+          <a:bodyPr anchor="b"/>
+          <a:lstStyle/>
+          <a:p>
+            <a:pPr lvl="0"/>
+            <a:r>
+              <a:rPr lang="de-DE" sz="2800" b="1" dirty="0" err="1"/>
+              <a:t>Timeseries</a:t>
+            </a:r>
+            <a:r>
+              <a:rPr lang="de-DE" sz="2800" b="1" dirty="0"/>
+              <a:t> and </a:t>
+            </a:r>
+            <a:r>
+              <a:rPr lang="de-DE" sz="2800" b="1" dirty="0" err="1"/>
+              <a:t>Seasonal</a:t>
+            </a:r>
+            <a:r>
+              <a:rPr lang="de-DE" sz="2800" b="1" dirty="0"/>
+              <a:t> </a:t>
+            </a:r>
+            <a:r>
+              <a:rPr lang="de-DE" sz="2800" b="1" dirty="0" err="1"/>
+              <a:t>cycle</a:t>
+            </a:r>
+            <a:endParaRPr lang="de-DE" sz="2800" b="1" dirty="0"/>
+          </a:p>
+        </p:txBody>
+      </p:sp>
+      <p:sp>
+        <p:nvSpPr>
+          <p:cNvPr id="4" name="Textfeld 3">
+            <a:extLst>
+              <a:ext uri="{FF2B5EF4-FFF2-40B4-BE49-F238E27FC236}">
+                <a16:creationId xmlns:a16="http://schemas.microsoft.com/office/drawing/2014/main" id="{FB4052EA-F220-4238-A0A9-D7286F599256}"/>
+              </a:ext>
+            </a:extLst>
+          </p:cNvPr>
+          <p:cNvSpPr txBox="1"/>
+          <p:nvPr/>
+        </p:nvSpPr>
+        <p:spPr>
+          <a:xfrm>
+            <a:off x="4492800" y="3319199"/>
+            <a:ext cx="2059200" cy="1792800"/>
+          </a:xfrm>
+          <a:prstGeom prst="rect">
+            <a:avLst/>
+          </a:prstGeom>
+          <a:noFill/>
+          <a:ln>
+            <a:noFill/>
+          </a:ln>
+        </p:spPr>
+        <p:txBody>
+          <a:bodyPr wrap="none" lIns="90000" tIns="45000" rIns="90000" bIns="45000" anchorCtr="0" compatLnSpc="0"/>
+          <a:lstStyle/>
+          <a:p>
+            <a:pPr hangingPunct="0"/>
+            <a:endParaRPr lang="de-DE">
+              <a:latin typeface="Liberation Sans" pitchFamily="18"/>
+              <a:ea typeface="Noto Sans CJK SC" pitchFamily="2"/>
+              <a:cs typeface="Lohit Devanagari" pitchFamily="2"/>
+            </a:endParaRPr>
+          </a:p>
+        </p:txBody>
+      </p:sp>
+      <p:sp>
+        <p:nvSpPr>
+          <p:cNvPr id="11" name="Inhaltsplatzhalter 1">
+            <a:extLst>
+              <a:ext uri="{FF2B5EF4-FFF2-40B4-BE49-F238E27FC236}">
+                <a16:creationId xmlns:a16="http://schemas.microsoft.com/office/drawing/2014/main" id="{055A2961-BFD6-D74B-B97C-4801602AF751}"/>
               </a:ext>
             </a:extLst>
           </p:cNvPr>
@@ -28015,8 +28032,8 @@
         </p:nvSpPr>
         <p:spPr bwMode="auto">
           <a:xfrm>
-            <a:off x="273908" y="5152861"/>
-            <a:ext cx="8870092" cy="1040805"/>
+            <a:off x="255586" y="5335022"/>
+            <a:ext cx="8870092" cy="820682"/>
           </a:xfrm>
           <a:prstGeom prst="rect">
             <a:avLst/>
@@ -28028,14 +28045,14 @@
           <a:effectLst/>
           <a:extLst>
             <a:ext uri="{909E8E84-426E-40dd-AFC4-6F175D3DCCD1}">
-              <a14:hiddenFill xmlns:lc="http://schemas.openxmlformats.org/drawingml/2006/lockedCanvas" xmlns="" xmlns:a14="http://schemas.microsoft.com/office/drawing/2010/main">
+              <a14:hiddenFill xmlns:a14="http://schemas.microsoft.com/office/drawing/2010/main" xmlns="" xmlns:lc="http://schemas.openxmlformats.org/drawingml/2006/lockedCanvas">
                 <a:solidFill>
                   <a:schemeClr val="accent1"/>
                 </a:solidFill>
               </a14:hiddenFill>
             </a:ext>
             <a:ext uri="{91240B29-F687-4f45-9708-019B960494DF}">
-              <a14:hiddenLine xmlns:lc="http://schemas.openxmlformats.org/drawingml/2006/lockedCanvas" xmlns="" xmlns:a14="http://schemas.microsoft.com/office/drawing/2010/main" w="9525">
+              <a14:hiddenLine xmlns:a14="http://schemas.microsoft.com/office/drawing/2010/main" xmlns="" xmlns:lc="http://schemas.openxmlformats.org/drawingml/2006/lockedCanvas" w="9525">
                 <a:solidFill>
                   <a:schemeClr val="tx1"/>
                 </a:solidFill>
@@ -28045,7 +28062,7 @@
               </a14:hiddenLine>
             </a:ext>
             <a:ext uri="{AF507438-7753-43e0-B8FC-AC1667EBCBE1}">
-              <a14:hiddenEffects xmlns:lc="http://schemas.openxmlformats.org/drawingml/2006/lockedCanvas" xmlns="" xmlns:a14="http://schemas.microsoft.com/office/drawing/2010/main">
+              <a14:hiddenEffects xmlns:a14="http://schemas.microsoft.com/office/drawing/2010/main" xmlns="" xmlns:lc="http://schemas.openxmlformats.org/drawingml/2006/lockedCanvas">
                 <a:effectLst>
                   <a:outerShdw dist="35921" dir="2700000" algn="ctr" rotWithShape="0">
                     <a:schemeClr val="bg2"/>
@@ -28216,244 +28233,110 @@
               <a:buFont typeface="Arial" panose="020B0604020202020204" pitchFamily="34" charset="0"/>
               <a:buChar char="•"/>
             </a:pPr>
-            <a:r>
-              <a:rPr lang="en-US" sz="2000" dirty="0">
-                <a:solidFill>
-                  <a:schemeClr val="tx1"/>
-                </a:solidFill>
-              </a:rPr>
-              <a:t>Total Transport northwards</a:t>
-            </a:r>
-          </a:p>
-          <a:p>
-            <a:pPr marL="342900" indent="-342900">
-              <a:spcBef>
-                <a:spcPts val="600"/>
-              </a:spcBef>
-              <a:buFont typeface="Arial" panose="020B0604020202020204" pitchFamily="34" charset="0"/>
-              <a:buChar char="•"/>
-            </a:pPr>
-            <a:r>
-              <a:rPr lang="en-US" sz="2000" dirty="0"/>
-              <a:t>Strong seasonal cycle not well visible </a:t>
-            </a:r>
-            <a:r>
-              <a:rPr lang="en-US" sz="2000" dirty="0">
-                <a:sym typeface="Wingdings" panose="05000000000000000000" pitchFamily="2" charset="2"/>
-              </a:rPr>
-              <a:t>&lt;-- by Western Boundary Transport</a:t>
-            </a:r>
-            <a:endParaRPr lang="en-US" sz="2000" dirty="0"/>
-          </a:p>
-          <a:p>
-            <a:pPr marL="342900" indent="-342900">
-              <a:spcBef>
-                <a:spcPts val="600"/>
-              </a:spcBef>
-              <a:buFont typeface="Arial" panose="020B0604020202020204" pitchFamily="34" charset="0"/>
-              <a:buChar char="•"/>
-            </a:pPr>
-            <a:r>
-              <a:rPr lang="en-US" sz="2000" b="1" dirty="0">
-                <a:solidFill>
-                  <a:srgbClr val="005AA0"/>
-                </a:solidFill>
-              </a:rPr>
-              <a:t>Strong </a:t>
-            </a:r>
-            <a:r>
-              <a:rPr lang="en-US" sz="2000" b="1" dirty="0" err="1">
-                <a:solidFill>
-                  <a:srgbClr val="005AA0"/>
-                </a:solidFill>
-              </a:rPr>
-              <a:t>intraannual</a:t>
-            </a:r>
-            <a:r>
-              <a:rPr lang="en-US" sz="2000" b="1" dirty="0">
-                <a:solidFill>
-                  <a:srgbClr val="005AA0"/>
-                </a:solidFill>
-              </a:rPr>
-              <a:t> variability in Total Transport --&gt; Smooth timeseries</a:t>
-            </a:r>
-          </a:p>
-        </p:txBody>
-      </p:sp>
-    </p:spTree>
-    <p:extLst>
-      <p:ext uri="{BB962C8B-B14F-4D97-AF65-F5344CB8AC3E}">
-        <p14:creationId xmlns:p14="http://schemas.microsoft.com/office/powerpoint/2010/main" val="943043837"/>
-      </p:ext>
-    </p:extLst>
-  </p:cSld>
-  <p:clrMapOvr>
-    <a:masterClrMapping/>
-  </p:clrMapOvr>
-</p:sld>
-</file>
-
-<file path=ppt/slides/slide5.xml><?xml version="1.0" encoding="utf-8"?>
-<p:sld xmlns:a="http://schemas.openxmlformats.org/drawingml/2006/main" xmlns:r="http://schemas.openxmlformats.org/officeDocument/2006/relationships" xmlns:p="http://schemas.openxmlformats.org/presentationml/2006/main">
-  <p:cSld>
-    <p:spTree>
-      <p:nvGrpSpPr>
-        <p:cNvPr id="1" name=""/>
-        <p:cNvGrpSpPr/>
-        <p:nvPr/>
-      </p:nvGrpSpPr>
-      <p:grpSpPr>
-        <a:xfrm>
-          <a:off x="0" y="0"/>
-          <a:ext cx="0" cy="0"/>
-          <a:chOff x="0" y="0"/>
-          <a:chExt cx="0" cy="0"/>
-        </a:xfrm>
-      </p:grpSpPr>
-      <p:sp>
-        <p:nvSpPr>
-          <p:cNvPr id="2" name="Fußzeilenplatzhalter 3">
-            <a:extLst>
-              <a:ext uri="{FF2B5EF4-FFF2-40B4-BE49-F238E27FC236}">
-                <a16:creationId xmlns:a16="http://schemas.microsoft.com/office/drawing/2014/main" id="{51B3B9ED-333A-49DF-A34F-CA68D6DE663D}"/>
-              </a:ext>
-            </a:extLst>
-          </p:cNvPr>
-          <p:cNvSpPr txBox="1">
-            <a:spLocks noGrp="1"/>
-          </p:cNvSpPr>
-          <p:nvPr>
-            <p:ph type="ftr" sz="quarter" idx="9"/>
-          </p:nvPr>
-        </p:nvSpPr>
+            <a:endParaRPr lang="en-US" sz="2000" b="1" dirty="0">
+              <a:solidFill>
+                <a:srgbClr val="005AA0"/>
+              </a:solidFill>
+            </a:endParaRPr>
+          </a:p>
+        </p:txBody>
+      </p:sp>
+      <p:pic>
+        <p:nvPicPr>
+          <p:cNvPr id="13" name="Grafik 12">
+            <a:extLst>
+              <a:ext uri="{FF2B5EF4-FFF2-40B4-BE49-F238E27FC236}">
+                <a16:creationId xmlns:a16="http://schemas.microsoft.com/office/drawing/2014/main" id="{5CFBC320-F5EE-4481-8222-803AAA676D7B}"/>
+              </a:ext>
+            </a:extLst>
+          </p:cNvPr>
+          <p:cNvPicPr>
+            <a:picLocks noChangeAspect="1"/>
+          </p:cNvPicPr>
+          <p:nvPr/>
+        </p:nvPicPr>
+        <p:blipFill>
+          <a:blip r:embed="rId3">
+            <a:extLst>
+              <a:ext uri="{28A0092B-C50C-407E-A947-70E740481C1C}">
+                <a14:useLocalDpi xmlns:a14="http://schemas.microsoft.com/office/drawing/2010/main" val="0"/>
+              </a:ext>
+              <a:ext uri="{96DAC541-7B7A-43D3-8B79-37D633B846F1}">
+                <asvg:svgBlip xmlns:asvg="http://schemas.microsoft.com/office/drawing/2016/SVG/main" r:embed="rId4"/>
+              </a:ext>
+            </a:extLst>
+          </a:blip>
+          <a:srcRect l="6157" r="6157"/>
+          <a:stretch/>
+        </p:blipFill>
         <p:spPr>
           <a:xfrm>
-            <a:off x="611280" y="6424562"/>
-            <a:ext cx="5400720" cy="433079"/>
+            <a:off x="0" y="1477651"/>
+            <a:ext cx="9125678" cy="3902697"/>
+          </a:xfrm>
+          <a:prstGeom prst="rect">
+            <a:avLst/>
+          </a:prstGeom>
+        </p:spPr>
+      </p:pic>
+      <p:sp>
+        <p:nvSpPr>
+          <p:cNvPr id="7" name="Rechteck 6">
+            <a:extLst>
+              <a:ext uri="{FF2B5EF4-FFF2-40B4-BE49-F238E27FC236}">
+                <a16:creationId xmlns:a16="http://schemas.microsoft.com/office/drawing/2014/main" id="{542BC92B-EDE7-43E5-98B7-07DC0214E84F}"/>
+              </a:ext>
+            </a:extLst>
+          </p:cNvPr>
+          <p:cNvSpPr/>
+          <p:nvPr/>
+        </p:nvSpPr>
+        <p:spPr>
+          <a:xfrm>
+            <a:off x="3695307" y="1972876"/>
+            <a:ext cx="1944352" cy="3240147"/>
           </a:xfrm>
           <a:prstGeom prst="rect">
             <a:avLst/>
           </a:prstGeom>
           <a:noFill/>
-          <a:ln>
-            <a:noFill/>
+          <a:ln w="57150">
+            <a:solidFill>
+              <a:schemeClr val="tx1"/>
+            </a:solidFill>
           </a:ln>
         </p:spPr>
-        <p:txBody>
-          <a:bodyPr wrap="square" lIns="0" tIns="0" rIns="0" bIns="0" anchor="t" anchorCtr="0">
-            <a:noAutofit/>
-          </a:bodyPr>
+        <p:style>
+          <a:lnRef idx="2">
+            <a:schemeClr val="accent1">
+              <a:shade val="50000"/>
+            </a:schemeClr>
+          </a:lnRef>
+          <a:fillRef idx="1">
+            <a:schemeClr val="accent1"/>
+          </a:fillRef>
+          <a:effectRef idx="0">
+            <a:schemeClr val="accent1"/>
+          </a:effectRef>
+          <a:fontRef idx="minor">
+            <a:schemeClr val="lt1"/>
+          </a:fontRef>
+        </p:style>
+        <p:txBody>
+          <a:bodyPr rtlCol="0" anchor="ctr"/>
           <a:lstStyle/>
           <a:p>
-            <a:pPr lvl="0" hangingPunct="0"/>
-            <a:r>
-              <a:rPr lang="de-DE" sz="1200" dirty="0">
-                <a:solidFill>
-                  <a:srgbClr val="808080"/>
-                </a:solidFill>
-                <a:latin typeface="Arial"/>
-                <a:cs typeface="Arial"/>
-              </a:rPr>
-              <a:t>Total Transport | Feb 10, 2022</a:t>
-            </a:r>
-          </a:p>
-        </p:txBody>
-      </p:sp>
-      <p:sp>
-        <p:nvSpPr>
-          <p:cNvPr id="3" name="Textplatzhalter 9">
-            <a:extLst>
-              <a:ext uri="{FF2B5EF4-FFF2-40B4-BE49-F238E27FC236}">
-                <a16:creationId xmlns:a16="http://schemas.microsoft.com/office/drawing/2014/main" id="{604C2E9C-9F98-4E6E-8B7F-A5FE12BFB48B}"/>
-              </a:ext>
-            </a:extLst>
-          </p:cNvPr>
-          <p:cNvSpPr txBox="1">
-            <a:spLocks noGrp="1"/>
-          </p:cNvSpPr>
-          <p:nvPr>
-            <p:ph type="body" idx="4294967295"/>
-          </p:nvPr>
-        </p:nvSpPr>
-        <p:spPr>
-          <a:xfrm>
-            <a:off x="273909" y="230166"/>
-            <a:ext cx="5365750" cy="871537"/>
-          </a:xfrm>
-        </p:spPr>
-        <p:txBody>
-          <a:bodyPr anchor="b"/>
-          <a:lstStyle/>
-          <a:p>
-            <a:pPr lvl="0"/>
-            <a:r>
-              <a:rPr lang="de-DE" sz="2800" b="1" dirty="0" err="1"/>
-              <a:t>Timeseries</a:t>
-            </a:r>
-            <a:r>
-              <a:rPr lang="de-DE" sz="2800" b="1" dirty="0"/>
-              <a:t> and </a:t>
-            </a:r>
-            <a:r>
-              <a:rPr lang="de-DE" sz="2800" b="1" dirty="0" err="1"/>
-              <a:t>Seasonal</a:t>
-            </a:r>
-            <a:r>
-              <a:rPr lang="de-DE" sz="2800" b="1" dirty="0"/>
-              <a:t> </a:t>
-            </a:r>
-            <a:r>
-              <a:rPr lang="de-DE" sz="2800" b="1" dirty="0" err="1"/>
-              <a:t>cycle</a:t>
-            </a:r>
-            <a:endParaRPr lang="de-DE" sz="2800" b="1" dirty="0"/>
-          </a:p>
-        </p:txBody>
-      </p:sp>
-      <p:sp>
-        <p:nvSpPr>
-          <p:cNvPr id="4" name="Textfeld 3">
-            <a:extLst>
-              <a:ext uri="{FF2B5EF4-FFF2-40B4-BE49-F238E27FC236}">
-                <a16:creationId xmlns:a16="http://schemas.microsoft.com/office/drawing/2014/main" id="{FB4052EA-F220-4238-A0A9-D7286F599256}"/>
-              </a:ext>
-            </a:extLst>
-          </p:cNvPr>
-          <p:cNvSpPr txBox="1"/>
-          <p:nvPr/>
-        </p:nvSpPr>
-        <p:spPr>
-          <a:xfrm>
-            <a:off x="4492800" y="3319199"/>
-            <a:ext cx="2059200" cy="1792800"/>
-          </a:xfrm>
-          <a:prstGeom prst="rect">
-            <a:avLst/>
-          </a:prstGeom>
-          <a:noFill/>
-          <a:ln>
-            <a:noFill/>
-          </a:ln>
-        </p:spPr>
-        <p:txBody>
-          <a:bodyPr wrap="none" lIns="90000" tIns="45000" rIns="90000" bIns="45000" anchorCtr="0" compatLnSpc="0"/>
-          <a:lstStyle/>
-          <a:p>
-            <a:pPr hangingPunct="0"/>
-            <a:endParaRPr lang="de-DE">
-              <a:latin typeface="Liberation Sans" pitchFamily="18"/>
-              <a:ea typeface="Noto Sans CJK SC" pitchFamily="2"/>
-              <a:cs typeface="Lohit Devanagari" pitchFamily="2"/>
-            </a:endParaRPr>
-          </a:p>
-        </p:txBody>
-      </p:sp>
-      <p:sp>
-        <p:nvSpPr>
-          <p:cNvPr id="11" name="Inhaltsplatzhalter 1">
-            <a:extLst>
-              <a:ext uri="{FF2B5EF4-FFF2-40B4-BE49-F238E27FC236}">
-                <a16:creationId xmlns:a16="http://schemas.microsoft.com/office/drawing/2014/main" id="{055A2961-BFD6-D74B-B97C-4801602AF751}"/>
+            <a:pPr algn="ctr"/>
+            <a:endParaRPr lang="en-GB"/>
+          </a:p>
+        </p:txBody>
+      </p:sp>
+      <p:sp>
+        <p:nvSpPr>
+          <p:cNvPr id="8" name="Inhaltsplatzhalter 1">
+            <a:extLst>
+              <a:ext uri="{FF2B5EF4-FFF2-40B4-BE49-F238E27FC236}">
+                <a16:creationId xmlns:a16="http://schemas.microsoft.com/office/drawing/2014/main" id="{8B2020B0-8758-499C-8FC7-DD188EAADFB7}"/>
               </a:ext>
             </a:extLst>
           </p:cNvPr>
@@ -28464,8 +28347,8 @@
         </p:nvSpPr>
         <p:spPr bwMode="auto">
           <a:xfrm>
-            <a:off x="255586" y="5335022"/>
-            <a:ext cx="8870092" cy="820682"/>
+            <a:off x="273908" y="5152861"/>
+            <a:ext cx="8870092" cy="1040805"/>
           </a:xfrm>
           <a:prstGeom prst="rect">
             <a:avLst/>
@@ -28477,14 +28360,14 @@
           <a:effectLst/>
           <a:extLst>
             <a:ext uri="{909E8E84-426E-40dd-AFC4-6F175D3DCCD1}">
-              <a14:hiddenFill xmlns:a14="http://schemas.microsoft.com/office/drawing/2010/main" xmlns="" xmlns:lc="http://schemas.openxmlformats.org/drawingml/2006/lockedCanvas">
+              <a14:hiddenFill xmlns:lc="http://schemas.openxmlformats.org/drawingml/2006/lockedCanvas" xmlns="" xmlns:a14="http://schemas.microsoft.com/office/drawing/2010/main">
                 <a:solidFill>
                   <a:schemeClr val="accent1"/>
                 </a:solidFill>
               </a14:hiddenFill>
             </a:ext>
             <a:ext uri="{91240B29-F687-4f45-9708-019B960494DF}">
-              <a14:hiddenLine xmlns:a14="http://schemas.microsoft.com/office/drawing/2010/main" xmlns="" xmlns:lc="http://schemas.openxmlformats.org/drawingml/2006/lockedCanvas" w="9525">
+              <a14:hiddenLine xmlns:lc="http://schemas.openxmlformats.org/drawingml/2006/lockedCanvas" xmlns="" xmlns:a14="http://schemas.microsoft.com/office/drawing/2010/main" w="9525">
                 <a:solidFill>
                   <a:schemeClr val="tx1"/>
                 </a:solidFill>
@@ -28494,7 +28377,7 @@
               </a14:hiddenLine>
             </a:ext>
             <a:ext uri="{AF507438-7753-43e0-B8FC-AC1667EBCBE1}">
-              <a14:hiddenEffects xmlns:a14="http://schemas.microsoft.com/office/drawing/2010/main" xmlns="" xmlns:lc="http://schemas.openxmlformats.org/drawingml/2006/lockedCanvas">
+              <a14:hiddenEffects xmlns:lc="http://schemas.openxmlformats.org/drawingml/2006/lockedCanvas" xmlns="" xmlns:a14="http://schemas.microsoft.com/office/drawing/2010/main">
                 <a:effectLst>
                   <a:outerShdw dist="35921" dir="2700000" algn="ctr" rotWithShape="0">
                     <a:schemeClr val="bg2"/>
@@ -28665,6 +28548,14 @@
               <a:buFont typeface="Arial" panose="020B0604020202020204" pitchFamily="34" charset="0"/>
               <a:buChar char="•"/>
             </a:pPr>
+            <a:r>
+              <a:rPr lang="en-US" sz="2000" dirty="0">
+                <a:solidFill>
+                  <a:schemeClr val="tx1"/>
+                </a:solidFill>
+              </a:rPr>
+              <a:t>6 month running mean </a:t>
+            </a:r>
             <a:endParaRPr lang="en-US" sz="2000" b="1" dirty="0">
               <a:solidFill>
                 <a:srgbClr val="005AA0"/>
@@ -28673,102 +28564,258 @@
           </a:p>
         </p:txBody>
       </p:sp>
-      <p:pic>
-        <p:nvPicPr>
-          <p:cNvPr id="13" name="Grafik 12">
-            <a:extLst>
-              <a:ext uri="{FF2B5EF4-FFF2-40B4-BE49-F238E27FC236}">
-                <a16:creationId xmlns:a16="http://schemas.microsoft.com/office/drawing/2014/main" id="{5CFBC320-F5EE-4481-8222-803AAA676D7B}"/>
-              </a:ext>
-            </a:extLst>
-          </p:cNvPr>
-          <p:cNvPicPr>
-            <a:picLocks noChangeAspect="1"/>
-          </p:cNvPicPr>
-          <p:nvPr/>
-        </p:nvPicPr>
-        <p:blipFill>
-          <a:blip r:embed="rId3">
-            <a:extLst>
-              <a:ext uri="{28A0092B-C50C-407E-A947-70E740481C1C}">
-                <a14:useLocalDpi xmlns:a14="http://schemas.microsoft.com/office/drawing/2010/main" val="0"/>
-              </a:ext>
-              <a:ext uri="{96DAC541-7B7A-43D3-8B79-37D633B846F1}">
-                <asvg:svgBlip xmlns:asvg="http://schemas.microsoft.com/office/drawing/2016/SVG/main" r:embed="rId4"/>
-              </a:ext>
-            </a:extLst>
-          </a:blip>
-          <a:srcRect l="6157" r="6157"/>
-          <a:stretch/>
-        </p:blipFill>
+    </p:spTree>
+    <p:extLst>
+      <p:ext uri="{BB962C8B-B14F-4D97-AF65-F5344CB8AC3E}">
+        <p14:creationId xmlns:p14="http://schemas.microsoft.com/office/powerpoint/2010/main" val="1594813597"/>
+      </p:ext>
+    </p:extLst>
+  </p:cSld>
+  <p:clrMapOvr>
+    <a:masterClrMapping/>
+  </p:clrMapOvr>
+  <p:timing>
+    <p:tnLst>
+      <p:par>
+        <p:cTn id="1" dur="indefinite" restart="never" nodeType="tmRoot">
+          <p:childTnLst>
+            <p:seq concurrent="1" nextAc="seek">
+              <p:cTn id="2" dur="indefinite" nodeType="mainSeq">
+                <p:childTnLst>
+                  <p:par>
+                    <p:cTn id="3" fill="hold">
+                      <p:stCondLst>
+                        <p:cond delay="indefinite"/>
+                      </p:stCondLst>
+                      <p:childTnLst>
+                        <p:par>
+                          <p:cTn id="4" fill="hold">
+                            <p:stCondLst>
+                              <p:cond delay="0"/>
+                            </p:stCondLst>
+                            <p:childTnLst>
+                              <p:par>
+                                <p:cTn id="5" presetID="1" presetClass="entr" presetSubtype="0" fill="hold" grpId="0" nodeType="clickEffect">
+                                  <p:stCondLst>
+                                    <p:cond delay="0"/>
+                                  </p:stCondLst>
+                                  <p:childTnLst>
+                                    <p:set>
+                                      <p:cBhvr>
+                                        <p:cTn id="6" dur="1" fill="hold">
+                                          <p:stCondLst>
+                                            <p:cond delay="0"/>
+                                          </p:stCondLst>
+                                        </p:cTn>
+                                        <p:tgtEl>
+                                          <p:spTgt spid="7"/>
+                                        </p:tgtEl>
+                                        <p:attrNameLst>
+                                          <p:attrName>style.visibility</p:attrName>
+                                        </p:attrNameLst>
+                                      </p:cBhvr>
+                                      <p:to>
+                                        <p:strVal val="visible"/>
+                                      </p:to>
+                                    </p:set>
+                                  </p:childTnLst>
+                                </p:cTn>
+                              </p:par>
+                            </p:childTnLst>
+                          </p:cTn>
+                        </p:par>
+                      </p:childTnLst>
+                    </p:cTn>
+                  </p:par>
+                </p:childTnLst>
+              </p:cTn>
+              <p:prevCondLst>
+                <p:cond evt="onPrev" delay="0">
+                  <p:tgtEl>
+                    <p:sldTgt/>
+                  </p:tgtEl>
+                </p:cond>
+              </p:prevCondLst>
+              <p:nextCondLst>
+                <p:cond evt="onNext" delay="0">
+                  <p:tgtEl>
+                    <p:sldTgt/>
+                  </p:tgtEl>
+                </p:cond>
+              </p:nextCondLst>
+            </p:seq>
+          </p:childTnLst>
+        </p:cTn>
+      </p:par>
+    </p:tnLst>
+    <p:bldLst>
+      <p:bldP spid="7" grpId="0" animBg="1"/>
+    </p:bldLst>
+  </p:timing>
+</p:sld>
+</file>
+
+<file path=ppt/slides/slide5.xml><?xml version="1.0" encoding="utf-8"?>
+<p:sld xmlns:a="http://schemas.openxmlformats.org/drawingml/2006/main" xmlns:r="http://schemas.openxmlformats.org/officeDocument/2006/relationships" xmlns:p="http://schemas.openxmlformats.org/presentationml/2006/main">
+  <p:cSld>
+    <p:spTree>
+      <p:nvGrpSpPr>
+        <p:cNvPr id="1" name=""/>
+        <p:cNvGrpSpPr/>
+        <p:nvPr/>
+      </p:nvGrpSpPr>
+      <p:grpSpPr>
+        <a:xfrm>
+          <a:off x="0" y="0"/>
+          <a:ext cx="0" cy="0"/>
+          <a:chOff x="0" y="0"/>
+          <a:chExt cx="0" cy="0"/>
+        </a:xfrm>
+      </p:grpSpPr>
+      <p:sp>
+        <p:nvSpPr>
+          <p:cNvPr id="2" name="Fußzeilenplatzhalter 3">
+            <a:extLst>
+              <a:ext uri="{FF2B5EF4-FFF2-40B4-BE49-F238E27FC236}">
+                <a16:creationId xmlns:a16="http://schemas.microsoft.com/office/drawing/2014/main" id="{51B3B9ED-333A-49DF-A34F-CA68D6DE663D}"/>
+              </a:ext>
+            </a:extLst>
+          </p:cNvPr>
+          <p:cNvSpPr txBox="1">
+            <a:spLocks noGrp="1"/>
+          </p:cNvSpPr>
+          <p:nvPr>
+            <p:ph type="ftr" sz="quarter" idx="9"/>
+          </p:nvPr>
+        </p:nvSpPr>
         <p:spPr>
           <a:xfrm>
-            <a:off x="0" y="1477651"/>
-            <a:ext cx="9125678" cy="3902697"/>
-          </a:xfrm>
-          <a:prstGeom prst="rect">
-            <a:avLst/>
-          </a:prstGeom>
-        </p:spPr>
-      </p:pic>
-      <p:sp>
-        <p:nvSpPr>
-          <p:cNvPr id="7" name="Rechteck 6">
-            <a:extLst>
-              <a:ext uri="{FF2B5EF4-FFF2-40B4-BE49-F238E27FC236}">
-                <a16:creationId xmlns:a16="http://schemas.microsoft.com/office/drawing/2014/main" id="{542BC92B-EDE7-43E5-98B7-07DC0214E84F}"/>
-              </a:ext>
-            </a:extLst>
-          </p:cNvPr>
-          <p:cNvSpPr/>
-          <p:nvPr/>
-        </p:nvSpPr>
-        <p:spPr>
-          <a:xfrm>
-            <a:off x="3695307" y="1972876"/>
-            <a:ext cx="1944352" cy="3240147"/>
+            <a:off x="611280" y="6424562"/>
+            <a:ext cx="5400720" cy="433079"/>
           </a:xfrm>
           <a:prstGeom prst="rect">
             <a:avLst/>
           </a:prstGeom>
           <a:noFill/>
-          <a:ln w="57150">
-            <a:solidFill>
-              <a:schemeClr val="tx1"/>
-            </a:solidFill>
+          <a:ln>
+            <a:noFill/>
           </a:ln>
         </p:spPr>
-        <p:style>
-          <a:lnRef idx="2">
-            <a:schemeClr val="accent1">
-              <a:shade val="50000"/>
-            </a:schemeClr>
-          </a:lnRef>
-          <a:fillRef idx="1">
-            <a:schemeClr val="accent1"/>
-          </a:fillRef>
-          <a:effectRef idx="0">
-            <a:schemeClr val="accent1"/>
-          </a:effectRef>
-          <a:fontRef idx="minor">
-            <a:schemeClr val="lt1"/>
-          </a:fontRef>
-        </p:style>
-        <p:txBody>
-          <a:bodyPr rtlCol="0" anchor="ctr"/>
+        <p:txBody>
+          <a:bodyPr wrap="square" lIns="0" tIns="0" rIns="0" bIns="0" anchor="t" anchorCtr="0">
+            <a:noAutofit/>
+          </a:bodyPr>
           <a:lstStyle/>
           <a:p>
-            <a:pPr algn="ctr"/>
-            <a:endParaRPr lang="en-GB"/>
-          </a:p>
-        </p:txBody>
-      </p:sp>
-      <p:sp>
-        <p:nvSpPr>
-          <p:cNvPr id="8" name="Inhaltsplatzhalter 1">
-            <a:extLst>
-              <a:ext uri="{FF2B5EF4-FFF2-40B4-BE49-F238E27FC236}">
-                <a16:creationId xmlns:a16="http://schemas.microsoft.com/office/drawing/2014/main" id="{8B2020B0-8758-499C-8FC7-DD188EAADFB7}"/>
+            <a:pPr lvl="0" hangingPunct="0"/>
+            <a:r>
+              <a:rPr lang="de-DE" sz="1200" dirty="0">
+                <a:solidFill>
+                  <a:srgbClr val="808080"/>
+                </a:solidFill>
+                <a:latin typeface="Arial"/>
+                <a:cs typeface="Arial"/>
+              </a:rPr>
+              <a:t>Total Transport | Feb 10, 2022</a:t>
+            </a:r>
+          </a:p>
+        </p:txBody>
+      </p:sp>
+      <p:sp>
+        <p:nvSpPr>
+          <p:cNvPr id="3" name="Textplatzhalter 9">
+            <a:extLst>
+              <a:ext uri="{FF2B5EF4-FFF2-40B4-BE49-F238E27FC236}">
+                <a16:creationId xmlns:a16="http://schemas.microsoft.com/office/drawing/2014/main" id="{604C2E9C-9F98-4E6E-8B7F-A5FE12BFB48B}"/>
+              </a:ext>
+            </a:extLst>
+          </p:cNvPr>
+          <p:cNvSpPr txBox="1">
+            <a:spLocks noGrp="1"/>
+          </p:cNvSpPr>
+          <p:nvPr>
+            <p:ph type="body" idx="4294967295"/>
+          </p:nvPr>
+        </p:nvSpPr>
+        <p:spPr>
+          <a:xfrm>
+            <a:off x="273909" y="230166"/>
+            <a:ext cx="5365750" cy="871537"/>
+          </a:xfrm>
+        </p:spPr>
+        <p:txBody>
+          <a:bodyPr anchor="b"/>
+          <a:lstStyle/>
+          <a:p>
+            <a:pPr lvl="0"/>
+            <a:r>
+              <a:rPr lang="de-DE" sz="2800" b="1" dirty="0" err="1"/>
+              <a:t>Timeseries</a:t>
+            </a:r>
+            <a:r>
+              <a:rPr lang="de-DE" sz="2800" b="1" dirty="0"/>
+              <a:t> and </a:t>
+            </a:r>
+            <a:r>
+              <a:rPr lang="de-DE" sz="2800" b="1" dirty="0" err="1"/>
+              <a:t>Seasonal</a:t>
+            </a:r>
+            <a:r>
+              <a:rPr lang="de-DE" sz="2800" b="1" dirty="0"/>
+              <a:t> </a:t>
+            </a:r>
+            <a:r>
+              <a:rPr lang="de-DE" sz="2800" b="1" dirty="0" err="1"/>
+              <a:t>cycle</a:t>
+            </a:r>
+            <a:endParaRPr lang="de-DE" sz="2800" b="1" dirty="0"/>
+          </a:p>
+        </p:txBody>
+      </p:sp>
+      <p:sp>
+        <p:nvSpPr>
+          <p:cNvPr id="4" name="Textfeld 3">
+            <a:extLst>
+              <a:ext uri="{FF2B5EF4-FFF2-40B4-BE49-F238E27FC236}">
+                <a16:creationId xmlns:a16="http://schemas.microsoft.com/office/drawing/2014/main" id="{FB4052EA-F220-4238-A0A9-D7286F599256}"/>
+              </a:ext>
+            </a:extLst>
+          </p:cNvPr>
+          <p:cNvSpPr txBox="1"/>
+          <p:nvPr/>
+        </p:nvSpPr>
+        <p:spPr>
+          <a:xfrm>
+            <a:off x="4492800" y="3319199"/>
+            <a:ext cx="2059200" cy="1792800"/>
+          </a:xfrm>
+          <a:prstGeom prst="rect">
+            <a:avLst/>
+          </a:prstGeom>
+          <a:noFill/>
+          <a:ln>
+            <a:noFill/>
+          </a:ln>
+        </p:spPr>
+        <p:txBody>
+          <a:bodyPr wrap="none" lIns="90000" tIns="45000" rIns="90000" bIns="45000" anchorCtr="0" compatLnSpc="0"/>
+          <a:lstStyle/>
+          <a:p>
+            <a:pPr hangingPunct="0"/>
+            <a:endParaRPr lang="de-DE">
+              <a:latin typeface="Liberation Sans" pitchFamily="18"/>
+              <a:ea typeface="Noto Sans CJK SC" pitchFamily="2"/>
+              <a:cs typeface="Lohit Devanagari" pitchFamily="2"/>
+            </a:endParaRPr>
+          </a:p>
+        </p:txBody>
+      </p:sp>
+      <p:sp>
+        <p:nvSpPr>
+          <p:cNvPr id="11" name="Inhaltsplatzhalter 1">
+            <a:extLst>
+              <a:ext uri="{FF2B5EF4-FFF2-40B4-BE49-F238E27FC236}">
+                <a16:creationId xmlns:a16="http://schemas.microsoft.com/office/drawing/2014/main" id="{055A2961-BFD6-D74B-B97C-4801602AF751}"/>
               </a:ext>
             </a:extLst>
           </p:cNvPr>
@@ -28779,8 +28826,8 @@
         </p:nvSpPr>
         <p:spPr bwMode="auto">
           <a:xfrm>
-            <a:off x="273908" y="5152861"/>
-            <a:ext cx="8870092" cy="1040805"/>
+            <a:off x="255586" y="5335022"/>
+            <a:ext cx="8870092" cy="820682"/>
           </a:xfrm>
           <a:prstGeom prst="rect">
             <a:avLst/>
@@ -28980,14 +29027,6 @@
               <a:buFont typeface="Arial" panose="020B0604020202020204" pitchFamily="34" charset="0"/>
               <a:buChar char="•"/>
             </a:pPr>
-            <a:r>
-              <a:rPr lang="en-US" sz="2000" dirty="0">
-                <a:solidFill>
-                  <a:schemeClr val="tx1"/>
-                </a:solidFill>
-              </a:rPr>
-              <a:t>6 month running mean </a:t>
-            </a:r>
             <a:endParaRPr lang="en-US" sz="2000" b="1" dirty="0">
               <a:solidFill>
                 <a:srgbClr val="005AA0"/>
@@ -28996,258 +29035,50 @@
           </a:p>
         </p:txBody>
       </p:sp>
-    </p:spTree>
-    <p:extLst>
-      <p:ext uri="{BB962C8B-B14F-4D97-AF65-F5344CB8AC3E}">
-        <p14:creationId xmlns:p14="http://schemas.microsoft.com/office/powerpoint/2010/main" val="1594813597"/>
-      </p:ext>
-    </p:extLst>
-  </p:cSld>
-  <p:clrMapOvr>
-    <a:masterClrMapping/>
-  </p:clrMapOvr>
-  <p:timing>
-    <p:tnLst>
-      <p:par>
-        <p:cTn id="1" dur="indefinite" restart="never" nodeType="tmRoot">
-          <p:childTnLst>
-            <p:seq concurrent="1" nextAc="seek">
-              <p:cTn id="2" dur="indefinite" nodeType="mainSeq">
-                <p:childTnLst>
-                  <p:par>
-                    <p:cTn id="3" fill="hold">
-                      <p:stCondLst>
-                        <p:cond delay="indefinite"/>
-                      </p:stCondLst>
-                      <p:childTnLst>
-                        <p:par>
-                          <p:cTn id="4" fill="hold">
-                            <p:stCondLst>
-                              <p:cond delay="0"/>
-                            </p:stCondLst>
-                            <p:childTnLst>
-                              <p:par>
-                                <p:cTn id="5" presetID="1" presetClass="entr" presetSubtype="0" fill="hold" grpId="0" nodeType="clickEffect">
-                                  <p:stCondLst>
-                                    <p:cond delay="0"/>
-                                  </p:stCondLst>
-                                  <p:childTnLst>
-                                    <p:set>
-                                      <p:cBhvr>
-                                        <p:cTn id="6" dur="1" fill="hold">
-                                          <p:stCondLst>
-                                            <p:cond delay="0"/>
-                                          </p:stCondLst>
-                                        </p:cTn>
-                                        <p:tgtEl>
-                                          <p:spTgt spid="7"/>
-                                        </p:tgtEl>
-                                        <p:attrNameLst>
-                                          <p:attrName>style.visibility</p:attrName>
-                                        </p:attrNameLst>
-                                      </p:cBhvr>
-                                      <p:to>
-                                        <p:strVal val="visible"/>
-                                      </p:to>
-                                    </p:set>
-                                  </p:childTnLst>
-                                </p:cTn>
-                              </p:par>
-                            </p:childTnLst>
-                          </p:cTn>
-                        </p:par>
-                      </p:childTnLst>
-                    </p:cTn>
-                  </p:par>
-                </p:childTnLst>
-              </p:cTn>
-              <p:prevCondLst>
-                <p:cond evt="onPrev" delay="0">
-                  <p:tgtEl>
-                    <p:sldTgt/>
-                  </p:tgtEl>
-                </p:cond>
-              </p:prevCondLst>
-              <p:nextCondLst>
-                <p:cond evt="onNext" delay="0">
-                  <p:tgtEl>
-                    <p:sldTgt/>
-                  </p:tgtEl>
-                </p:cond>
-              </p:nextCondLst>
-            </p:seq>
-          </p:childTnLst>
-        </p:cTn>
-      </p:par>
-    </p:tnLst>
-    <p:bldLst>
-      <p:bldP spid="7" grpId="0" animBg="1"/>
-    </p:bldLst>
-  </p:timing>
-</p:sld>
-</file>
-
-<file path=ppt/slides/slide6.xml><?xml version="1.0" encoding="utf-8"?>
-<p:sld xmlns:a="http://schemas.openxmlformats.org/drawingml/2006/main" xmlns:r="http://schemas.openxmlformats.org/officeDocument/2006/relationships" xmlns:p="http://schemas.openxmlformats.org/presentationml/2006/main">
-  <p:cSld>
-    <p:spTree>
-      <p:nvGrpSpPr>
-        <p:cNvPr id="1" name=""/>
-        <p:cNvGrpSpPr/>
-        <p:nvPr/>
-      </p:nvGrpSpPr>
-      <p:grpSpPr>
-        <a:xfrm>
-          <a:off x="0" y="0"/>
-          <a:ext cx="0" cy="0"/>
-          <a:chOff x="0" y="0"/>
-          <a:chExt cx="0" cy="0"/>
-        </a:xfrm>
-      </p:grpSpPr>
-      <p:sp>
-        <p:nvSpPr>
-          <p:cNvPr id="2" name="Fußzeilenplatzhalter 3">
-            <a:extLst>
-              <a:ext uri="{FF2B5EF4-FFF2-40B4-BE49-F238E27FC236}">
-                <a16:creationId xmlns:a16="http://schemas.microsoft.com/office/drawing/2014/main" id="{51B3B9ED-333A-49DF-A34F-CA68D6DE663D}"/>
-              </a:ext>
-            </a:extLst>
-          </p:cNvPr>
-          <p:cNvSpPr txBox="1">
-            <a:spLocks noGrp="1"/>
-          </p:cNvSpPr>
-          <p:nvPr>
-            <p:ph type="ftr" sz="quarter" idx="9"/>
-          </p:nvPr>
-        </p:nvSpPr>
+      <p:pic>
+        <p:nvPicPr>
+          <p:cNvPr id="13" name="Grafik 12">
+            <a:extLst>
+              <a:ext uri="{FF2B5EF4-FFF2-40B4-BE49-F238E27FC236}">
+                <a16:creationId xmlns:a16="http://schemas.microsoft.com/office/drawing/2014/main" id="{5CFBC320-F5EE-4481-8222-803AAA676D7B}"/>
+              </a:ext>
+            </a:extLst>
+          </p:cNvPr>
+          <p:cNvPicPr>
+            <a:picLocks noChangeAspect="1"/>
+          </p:cNvPicPr>
+          <p:nvPr/>
+        </p:nvPicPr>
+        <p:blipFill>
+          <a:blip r:embed="rId3">
+            <a:extLst>
+              <a:ext uri="{28A0092B-C50C-407E-A947-70E740481C1C}">
+                <a14:useLocalDpi xmlns:a14="http://schemas.microsoft.com/office/drawing/2010/main" val="0"/>
+              </a:ext>
+              <a:ext uri="{96DAC541-7B7A-43D3-8B79-37D633B846F1}">
+                <asvg:svgBlip xmlns:asvg="http://schemas.microsoft.com/office/drawing/2016/SVG/main" r:embed="rId4"/>
+              </a:ext>
+            </a:extLst>
+          </a:blip>
+          <a:srcRect l="6157" r="6157"/>
+          <a:stretch/>
+        </p:blipFill>
         <p:spPr>
           <a:xfrm>
-            <a:off x="611280" y="6424562"/>
-            <a:ext cx="5400720" cy="433079"/>
+            <a:off x="0" y="1477651"/>
+            <a:ext cx="9125678" cy="3902697"/>
           </a:xfrm>
           <a:prstGeom prst="rect">
             <a:avLst/>
           </a:prstGeom>
-          <a:noFill/>
-          <a:ln>
-            <a:noFill/>
-          </a:ln>
         </p:spPr>
-        <p:txBody>
-          <a:bodyPr wrap="square" lIns="0" tIns="0" rIns="0" bIns="0" anchor="t" anchorCtr="0">
-            <a:noAutofit/>
-          </a:bodyPr>
-          <a:lstStyle/>
-          <a:p>
-            <a:pPr lvl="0" hangingPunct="0"/>
-            <a:r>
-              <a:rPr lang="de-DE" sz="1200" dirty="0">
-                <a:solidFill>
-                  <a:srgbClr val="808080"/>
-                </a:solidFill>
-                <a:latin typeface="Arial"/>
-                <a:cs typeface="Arial"/>
-              </a:rPr>
-              <a:t>Total Transport | Feb 10, 2022</a:t>
-            </a:r>
-          </a:p>
-        </p:txBody>
-      </p:sp>
-      <p:sp>
-        <p:nvSpPr>
-          <p:cNvPr id="3" name="Textplatzhalter 9">
-            <a:extLst>
-              <a:ext uri="{FF2B5EF4-FFF2-40B4-BE49-F238E27FC236}">
-                <a16:creationId xmlns:a16="http://schemas.microsoft.com/office/drawing/2014/main" id="{604C2E9C-9F98-4E6E-8B7F-A5FE12BFB48B}"/>
-              </a:ext>
-            </a:extLst>
-          </p:cNvPr>
-          <p:cNvSpPr txBox="1">
-            <a:spLocks noGrp="1"/>
-          </p:cNvSpPr>
-          <p:nvPr>
-            <p:ph type="body" idx="4294967295"/>
-          </p:nvPr>
-        </p:nvSpPr>
-        <p:spPr>
-          <a:xfrm>
-            <a:off x="273909" y="230166"/>
-            <a:ext cx="5365750" cy="871537"/>
-          </a:xfrm>
-        </p:spPr>
-        <p:txBody>
-          <a:bodyPr anchor="b"/>
-          <a:lstStyle/>
-          <a:p>
-            <a:pPr lvl="0"/>
-            <a:r>
-              <a:rPr lang="de-DE" sz="2800" b="1" dirty="0" err="1"/>
-              <a:t>Timeseries</a:t>
-            </a:r>
-            <a:r>
-              <a:rPr lang="de-DE" sz="2800" b="1" dirty="0"/>
-              <a:t> and </a:t>
-            </a:r>
-            <a:r>
-              <a:rPr lang="de-DE" sz="2800" b="1" dirty="0" err="1"/>
-              <a:t>Seasonal</a:t>
-            </a:r>
-            <a:r>
-              <a:rPr lang="de-DE" sz="2800" b="1" dirty="0"/>
-              <a:t> </a:t>
-            </a:r>
-            <a:r>
-              <a:rPr lang="de-DE" sz="2800" b="1" dirty="0" err="1"/>
-              <a:t>cycle</a:t>
-            </a:r>
-            <a:endParaRPr lang="de-DE" sz="2800" b="1" dirty="0"/>
-          </a:p>
-        </p:txBody>
-      </p:sp>
-      <p:sp>
-        <p:nvSpPr>
-          <p:cNvPr id="4" name="Textfeld 3">
-            <a:extLst>
-              <a:ext uri="{FF2B5EF4-FFF2-40B4-BE49-F238E27FC236}">
-                <a16:creationId xmlns:a16="http://schemas.microsoft.com/office/drawing/2014/main" id="{FB4052EA-F220-4238-A0A9-D7286F599256}"/>
-              </a:ext>
-            </a:extLst>
-          </p:cNvPr>
-          <p:cNvSpPr txBox="1"/>
-          <p:nvPr/>
-        </p:nvSpPr>
-        <p:spPr>
-          <a:xfrm>
-            <a:off x="4492800" y="3319199"/>
-            <a:ext cx="2059200" cy="1792800"/>
-          </a:xfrm>
-          <a:prstGeom prst="rect">
-            <a:avLst/>
-          </a:prstGeom>
-          <a:noFill/>
-          <a:ln>
-            <a:noFill/>
-          </a:ln>
-        </p:spPr>
-        <p:txBody>
-          <a:bodyPr wrap="none" lIns="90000" tIns="45000" rIns="90000" bIns="45000" anchorCtr="0" compatLnSpc="0"/>
-          <a:lstStyle/>
-          <a:p>
-            <a:pPr hangingPunct="0"/>
-            <a:endParaRPr lang="de-DE">
-              <a:latin typeface="Liberation Sans" pitchFamily="18"/>
-              <a:ea typeface="Noto Sans CJK SC" pitchFamily="2"/>
-              <a:cs typeface="Lohit Devanagari" pitchFamily="2"/>
-            </a:endParaRPr>
-          </a:p>
-        </p:txBody>
-      </p:sp>
-      <p:sp>
-        <p:nvSpPr>
-          <p:cNvPr id="11" name="Inhaltsplatzhalter 1">
-            <a:extLst>
-              <a:ext uri="{FF2B5EF4-FFF2-40B4-BE49-F238E27FC236}">
-                <a16:creationId xmlns:a16="http://schemas.microsoft.com/office/drawing/2014/main" id="{055A2961-BFD6-D74B-B97C-4801602AF751}"/>
+      </p:pic>
+      <p:sp>
+        <p:nvSpPr>
+          <p:cNvPr id="7" name="Inhaltsplatzhalter 1">
+            <a:extLst>
+              <a:ext uri="{FF2B5EF4-FFF2-40B4-BE49-F238E27FC236}">
+                <a16:creationId xmlns:a16="http://schemas.microsoft.com/office/drawing/2014/main" id="{6B5C8CFD-D0BC-40F2-8CC5-A3B01CB25010}"/>
               </a:ext>
             </a:extLst>
           </p:cNvPr>
@@ -29258,8 +29089,8 @@
         </p:nvSpPr>
         <p:spPr bwMode="auto">
           <a:xfrm>
-            <a:off x="255586" y="5335022"/>
-            <a:ext cx="8870092" cy="820682"/>
+            <a:off x="273908" y="5152861"/>
+            <a:ext cx="8870092" cy="1040805"/>
           </a:xfrm>
           <a:prstGeom prst="rect">
             <a:avLst/>
@@ -29459,58 +29290,228 @@
               <a:buFont typeface="Arial" panose="020B0604020202020204" pitchFamily="34" charset="0"/>
               <a:buChar char="•"/>
             </a:pPr>
-            <a:endParaRPr lang="en-US" sz="2000" b="1" dirty="0">
-              <a:solidFill>
-                <a:srgbClr val="005AA0"/>
-              </a:solidFill>
-            </a:endParaRPr>
-          </a:p>
-        </p:txBody>
-      </p:sp>
-      <p:pic>
-        <p:nvPicPr>
-          <p:cNvPr id="13" name="Grafik 12">
-            <a:extLst>
-              <a:ext uri="{FF2B5EF4-FFF2-40B4-BE49-F238E27FC236}">
-                <a16:creationId xmlns:a16="http://schemas.microsoft.com/office/drawing/2014/main" id="{5CFBC320-F5EE-4481-8222-803AAA676D7B}"/>
-              </a:ext>
-            </a:extLst>
-          </p:cNvPr>
-          <p:cNvPicPr>
-            <a:picLocks noChangeAspect="1"/>
-          </p:cNvPicPr>
-          <p:nvPr/>
-        </p:nvPicPr>
-        <p:blipFill>
-          <a:blip r:embed="rId3">
-            <a:extLst>
-              <a:ext uri="{28A0092B-C50C-407E-A947-70E740481C1C}">
-                <a14:useLocalDpi xmlns:a14="http://schemas.microsoft.com/office/drawing/2010/main" val="0"/>
-              </a:ext>
-              <a:ext uri="{96DAC541-7B7A-43D3-8B79-37D633B846F1}">
-                <asvg:svgBlip xmlns:asvg="http://schemas.microsoft.com/office/drawing/2016/SVG/main" r:embed="rId4"/>
-              </a:ext>
-            </a:extLst>
-          </a:blip>
-          <a:srcRect l="6157" r="6157"/>
-          <a:stretch/>
-        </p:blipFill>
+            <a:r>
+              <a:rPr lang="en-US" sz="2000" dirty="0">
+                <a:solidFill>
+                  <a:schemeClr val="tx1"/>
+                </a:solidFill>
+              </a:rPr>
+              <a:t>Total Transport 5Sv – 25Sv northwards</a:t>
+            </a:r>
+          </a:p>
+          <a:p>
+            <a:pPr marL="342900" indent="-342900">
+              <a:spcBef>
+                <a:spcPts val="600"/>
+              </a:spcBef>
+              <a:buFont typeface="Arial" panose="020B0604020202020204" pitchFamily="34" charset="0"/>
+              <a:buChar char="•"/>
+            </a:pPr>
+            <a:r>
+              <a:rPr lang="en-US" sz="2000" dirty="0"/>
+              <a:t>Strong seasonal cycle </a:t>
+            </a:r>
+            <a:r>
+              <a:rPr lang="en-US" sz="2000" dirty="0">
+                <a:sym typeface="Wingdings" panose="05000000000000000000" pitchFamily="2" charset="2"/>
+              </a:rPr>
+              <a:t> by Ekman Transport</a:t>
+            </a:r>
+            <a:endParaRPr lang="en-US" sz="2000" dirty="0"/>
+          </a:p>
+          <a:p>
+            <a:pPr marL="342900" indent="-342900">
+              <a:spcBef>
+                <a:spcPts val="600"/>
+              </a:spcBef>
+              <a:buFont typeface="Arial" panose="020B0604020202020204" pitchFamily="34" charset="0"/>
+              <a:buChar char="•"/>
+            </a:pPr>
+            <a:r>
+              <a:rPr lang="en-US" sz="2000" b="1" dirty="0">
+                <a:solidFill>
+                  <a:srgbClr val="005AA0"/>
+                </a:solidFill>
+              </a:rPr>
+              <a:t>Strong interannual variability even for smoothed data</a:t>
+            </a:r>
+          </a:p>
+        </p:txBody>
+      </p:sp>
+    </p:spTree>
+    <p:extLst>
+      <p:ext uri="{BB962C8B-B14F-4D97-AF65-F5344CB8AC3E}">
+        <p14:creationId xmlns:p14="http://schemas.microsoft.com/office/powerpoint/2010/main" val="2761930214"/>
+      </p:ext>
+    </p:extLst>
+  </p:cSld>
+  <p:clrMapOvr>
+    <a:masterClrMapping/>
+  </p:clrMapOvr>
+</p:sld>
+</file>
+
+<file path=ppt/slides/slide6.xml><?xml version="1.0" encoding="utf-8"?>
+<p:sld xmlns:a="http://schemas.openxmlformats.org/drawingml/2006/main" xmlns:r="http://schemas.openxmlformats.org/officeDocument/2006/relationships" xmlns:p="http://schemas.openxmlformats.org/presentationml/2006/main">
+  <p:cSld>
+    <p:spTree>
+      <p:nvGrpSpPr>
+        <p:cNvPr id="1" name=""/>
+        <p:cNvGrpSpPr/>
+        <p:nvPr/>
+      </p:nvGrpSpPr>
+      <p:grpSpPr>
+        <a:xfrm>
+          <a:off x="0" y="0"/>
+          <a:ext cx="0" cy="0"/>
+          <a:chOff x="0" y="0"/>
+          <a:chExt cx="0" cy="0"/>
+        </a:xfrm>
+      </p:grpSpPr>
+      <p:sp>
+        <p:nvSpPr>
+          <p:cNvPr id="2" name="Fußzeilenplatzhalter 3">
+            <a:extLst>
+              <a:ext uri="{FF2B5EF4-FFF2-40B4-BE49-F238E27FC236}">
+                <a16:creationId xmlns:a16="http://schemas.microsoft.com/office/drawing/2014/main" id="{51B3B9ED-333A-49DF-A34F-CA68D6DE663D}"/>
+              </a:ext>
+            </a:extLst>
+          </p:cNvPr>
+          <p:cNvSpPr txBox="1">
+            <a:spLocks noGrp="1"/>
+          </p:cNvSpPr>
+          <p:nvPr>
+            <p:ph type="ftr" sz="quarter" idx="9"/>
+          </p:nvPr>
+        </p:nvSpPr>
         <p:spPr>
           <a:xfrm>
-            <a:off x="0" y="1477651"/>
-            <a:ext cx="9125678" cy="3902697"/>
+            <a:off x="611280" y="6424562"/>
+            <a:ext cx="5400720" cy="433079"/>
           </a:xfrm>
           <a:prstGeom prst="rect">
             <a:avLst/>
           </a:prstGeom>
+          <a:noFill/>
+          <a:ln>
+            <a:noFill/>
+          </a:ln>
         </p:spPr>
-      </p:pic>
-      <p:sp>
-        <p:nvSpPr>
-          <p:cNvPr id="7" name="Inhaltsplatzhalter 1">
-            <a:extLst>
-              <a:ext uri="{FF2B5EF4-FFF2-40B4-BE49-F238E27FC236}">
-                <a16:creationId xmlns:a16="http://schemas.microsoft.com/office/drawing/2014/main" id="{6B5C8CFD-D0BC-40F2-8CC5-A3B01CB25010}"/>
+        <p:txBody>
+          <a:bodyPr wrap="square" lIns="0" tIns="0" rIns="0" bIns="0" anchor="t" anchorCtr="0">
+            <a:noAutofit/>
+          </a:bodyPr>
+          <a:lstStyle/>
+          <a:p>
+            <a:pPr lvl="0" hangingPunct="0"/>
+            <a:r>
+              <a:rPr lang="de-DE" sz="1200" dirty="0">
+                <a:solidFill>
+                  <a:srgbClr val="808080"/>
+                </a:solidFill>
+                <a:latin typeface="Arial"/>
+                <a:cs typeface="Arial"/>
+              </a:rPr>
+              <a:t>Total Transport | Feb 10, 2022</a:t>
+            </a:r>
+          </a:p>
+        </p:txBody>
+      </p:sp>
+      <p:sp>
+        <p:nvSpPr>
+          <p:cNvPr id="3" name="Textplatzhalter 9">
+            <a:extLst>
+              <a:ext uri="{FF2B5EF4-FFF2-40B4-BE49-F238E27FC236}">
+                <a16:creationId xmlns:a16="http://schemas.microsoft.com/office/drawing/2014/main" id="{604C2E9C-9F98-4E6E-8B7F-A5FE12BFB48B}"/>
+              </a:ext>
+            </a:extLst>
+          </p:cNvPr>
+          <p:cNvSpPr txBox="1">
+            <a:spLocks noGrp="1"/>
+          </p:cNvSpPr>
+          <p:nvPr>
+            <p:ph type="body" idx="4294967295"/>
+          </p:nvPr>
+        </p:nvSpPr>
+        <p:spPr>
+          <a:xfrm>
+            <a:off x="273909" y="230166"/>
+            <a:ext cx="5365750" cy="871537"/>
+          </a:xfrm>
+        </p:spPr>
+        <p:txBody>
+          <a:bodyPr anchor="b"/>
+          <a:lstStyle/>
+          <a:p>
+            <a:pPr lvl="0"/>
+            <a:r>
+              <a:rPr lang="de-DE" sz="2800" b="1" dirty="0" err="1"/>
+              <a:t>Timeseries</a:t>
+            </a:r>
+            <a:r>
+              <a:rPr lang="de-DE" sz="2800" b="1" dirty="0"/>
+              <a:t> and </a:t>
+            </a:r>
+            <a:r>
+              <a:rPr lang="de-DE" sz="2800" b="1" dirty="0" err="1"/>
+              <a:t>Seasonal</a:t>
+            </a:r>
+            <a:r>
+              <a:rPr lang="de-DE" sz="2800" b="1" dirty="0"/>
+              <a:t> </a:t>
+            </a:r>
+            <a:r>
+              <a:rPr lang="de-DE" sz="2800" b="1" dirty="0" err="1"/>
+              <a:t>cycle</a:t>
+            </a:r>
+            <a:endParaRPr lang="de-DE" sz="2800" b="1" dirty="0"/>
+          </a:p>
+        </p:txBody>
+      </p:sp>
+      <p:sp>
+        <p:nvSpPr>
+          <p:cNvPr id="4" name="Textfeld 3">
+            <a:extLst>
+              <a:ext uri="{FF2B5EF4-FFF2-40B4-BE49-F238E27FC236}">
+                <a16:creationId xmlns:a16="http://schemas.microsoft.com/office/drawing/2014/main" id="{FB4052EA-F220-4238-A0A9-D7286F599256}"/>
+              </a:ext>
+            </a:extLst>
+          </p:cNvPr>
+          <p:cNvSpPr txBox="1"/>
+          <p:nvPr/>
+        </p:nvSpPr>
+        <p:spPr>
+          <a:xfrm>
+            <a:off x="4492800" y="3319199"/>
+            <a:ext cx="2059200" cy="1792800"/>
+          </a:xfrm>
+          <a:prstGeom prst="rect">
+            <a:avLst/>
+          </a:prstGeom>
+          <a:noFill/>
+          <a:ln>
+            <a:noFill/>
+          </a:ln>
+        </p:spPr>
+        <p:txBody>
+          <a:bodyPr wrap="none" lIns="90000" tIns="45000" rIns="90000" bIns="45000" anchorCtr="0" compatLnSpc="0"/>
+          <a:lstStyle/>
+          <a:p>
+            <a:pPr hangingPunct="0"/>
+            <a:endParaRPr lang="de-DE">
+              <a:latin typeface="Liberation Sans" pitchFamily="18"/>
+              <a:ea typeface="Noto Sans CJK SC" pitchFamily="2"/>
+              <a:cs typeface="Lohit Devanagari" pitchFamily="2"/>
+            </a:endParaRPr>
+          </a:p>
+        </p:txBody>
+      </p:sp>
+      <p:sp>
+        <p:nvSpPr>
+          <p:cNvPr id="11" name="Inhaltsplatzhalter 1">
+            <a:extLst>
+              <a:ext uri="{FF2B5EF4-FFF2-40B4-BE49-F238E27FC236}">
+                <a16:creationId xmlns:a16="http://schemas.microsoft.com/office/drawing/2014/main" id="{055A2961-BFD6-D74B-B97C-4801602AF751}"/>
               </a:ext>
             </a:extLst>
           </p:cNvPr>
@@ -29521,8 +29522,8 @@
         </p:nvSpPr>
         <p:spPr bwMode="auto">
           <a:xfrm>
-            <a:off x="273908" y="5152861"/>
-            <a:ext cx="8870092" cy="1040805"/>
+            <a:off x="255586" y="5335022"/>
+            <a:ext cx="8870092" cy="820682"/>
           </a:xfrm>
           <a:prstGeom prst="rect">
             <a:avLst/>
@@ -29534,14 +29535,14 @@
           <a:effectLst/>
           <a:extLst>
             <a:ext uri="{909E8E84-426E-40dd-AFC4-6F175D3DCCD1}">
-              <a14:hiddenFill xmlns:lc="http://schemas.openxmlformats.org/drawingml/2006/lockedCanvas" xmlns="" xmlns:a14="http://schemas.microsoft.com/office/drawing/2010/main">
+              <a14:hiddenFill xmlns:a14="http://schemas.microsoft.com/office/drawing/2010/main" xmlns="" xmlns:lc="http://schemas.openxmlformats.org/drawingml/2006/lockedCanvas">
                 <a:solidFill>
                   <a:schemeClr val="accent1"/>
                 </a:solidFill>
               </a14:hiddenFill>
             </a:ext>
             <a:ext uri="{91240B29-F687-4f45-9708-019B960494DF}">
-              <a14:hiddenLine xmlns:lc="http://schemas.openxmlformats.org/drawingml/2006/lockedCanvas" xmlns="" xmlns:a14="http://schemas.microsoft.com/office/drawing/2010/main" w="9525">
+              <a14:hiddenLine xmlns:a14="http://schemas.microsoft.com/office/drawing/2010/main" xmlns="" xmlns:lc="http://schemas.openxmlformats.org/drawingml/2006/lockedCanvas" w="9525">
                 <a:solidFill>
                   <a:schemeClr val="tx1"/>
                 </a:solidFill>
@@ -29551,7 +29552,7 @@
               </a14:hiddenLine>
             </a:ext>
             <a:ext uri="{AF507438-7753-43e0-B8FC-AC1667EBCBE1}">
-              <a14:hiddenEffects xmlns:lc="http://schemas.openxmlformats.org/drawingml/2006/lockedCanvas" xmlns="" xmlns:a14="http://schemas.microsoft.com/office/drawing/2010/main">
+              <a14:hiddenEffects xmlns:a14="http://schemas.microsoft.com/office/drawing/2010/main" xmlns="" xmlns:lc="http://schemas.openxmlformats.org/drawingml/2006/lockedCanvas">
                 <a:effectLst>
                   <a:outerShdw dist="35921" dir="2700000" algn="ctr" rotWithShape="0">
                     <a:schemeClr val="bg2"/>
@@ -29722,15 +29723,261 @@
               <a:buFont typeface="Arial" panose="020B0604020202020204" pitchFamily="34" charset="0"/>
               <a:buChar char="•"/>
             </a:pPr>
-            <a:r>
-              <a:rPr lang="en-US" sz="2000" dirty="0">
+            <a:endParaRPr lang="en-US" sz="2000" b="1" dirty="0">
+              <a:solidFill>
+                <a:srgbClr val="005AA0"/>
+              </a:solidFill>
+            </a:endParaRPr>
+          </a:p>
+        </p:txBody>
+      </p:sp>
+      <p:pic>
+        <p:nvPicPr>
+          <p:cNvPr id="13" name="Grafik 12">
+            <a:extLst>
+              <a:ext uri="{FF2B5EF4-FFF2-40B4-BE49-F238E27FC236}">
+                <a16:creationId xmlns:a16="http://schemas.microsoft.com/office/drawing/2014/main" id="{5CFBC320-F5EE-4481-8222-803AAA676D7B}"/>
+              </a:ext>
+            </a:extLst>
+          </p:cNvPr>
+          <p:cNvPicPr>
+            <a:picLocks noChangeAspect="1"/>
+          </p:cNvPicPr>
+          <p:nvPr/>
+        </p:nvPicPr>
+        <p:blipFill>
+          <a:blip r:embed="rId3">
+            <a:extLst>
+              <a:ext uri="{28A0092B-C50C-407E-A947-70E740481C1C}">
+                <a14:useLocalDpi xmlns:a14="http://schemas.microsoft.com/office/drawing/2010/main" val="0"/>
+              </a:ext>
+              <a:ext uri="{96DAC541-7B7A-43D3-8B79-37D633B846F1}">
+                <asvg:svgBlip xmlns:asvg="http://schemas.microsoft.com/office/drawing/2016/SVG/main" r:embed="rId4"/>
+              </a:ext>
+            </a:extLst>
+          </a:blip>
+          <a:srcRect l="6157" r="6157"/>
+          <a:stretch/>
+        </p:blipFill>
+        <p:spPr>
+          <a:xfrm>
+            <a:off x="0" y="1477651"/>
+            <a:ext cx="9125678" cy="3902697"/>
+          </a:xfrm>
+          <a:prstGeom prst="rect">
+            <a:avLst/>
+          </a:prstGeom>
+        </p:spPr>
+      </p:pic>
+      <p:sp>
+        <p:nvSpPr>
+          <p:cNvPr id="7" name="Inhaltsplatzhalter 1">
+            <a:extLst>
+              <a:ext uri="{FF2B5EF4-FFF2-40B4-BE49-F238E27FC236}">
+                <a16:creationId xmlns:a16="http://schemas.microsoft.com/office/drawing/2014/main" id="{6B5C8CFD-D0BC-40F2-8CC5-A3B01CB25010}"/>
+              </a:ext>
+            </a:extLst>
+          </p:cNvPr>
+          <p:cNvSpPr>
+            <a:spLocks noGrp="1"/>
+          </p:cNvSpPr>
+          <p:nvPr/>
+        </p:nvSpPr>
+        <p:spPr bwMode="auto">
+          <a:xfrm>
+            <a:off x="273908" y="5152861"/>
+            <a:ext cx="8870092" cy="1040805"/>
+          </a:xfrm>
+          <a:prstGeom prst="rect">
+            <a:avLst/>
+          </a:prstGeom>
+          <a:noFill/>
+          <a:ln>
+            <a:noFill/>
+          </a:ln>
+          <a:effectLst/>
+          <a:extLst>
+            <a:ext uri="{909E8E84-426E-40dd-AFC4-6F175D3DCCD1}">
+              <a14:hiddenFill xmlns:a14="http://schemas.microsoft.com/office/drawing/2010/main" xmlns="" xmlns:lc="http://schemas.openxmlformats.org/drawingml/2006/lockedCanvas">
+                <a:solidFill>
+                  <a:schemeClr val="accent1"/>
+                </a:solidFill>
+              </a14:hiddenFill>
+            </a:ext>
+            <a:ext uri="{91240B29-F687-4f45-9708-019B960494DF}">
+              <a14:hiddenLine xmlns:a14="http://schemas.microsoft.com/office/drawing/2010/main" xmlns="" xmlns:lc="http://schemas.openxmlformats.org/drawingml/2006/lockedCanvas" w="9525">
                 <a:solidFill>
                   <a:schemeClr val="tx1"/>
                 </a:solidFill>
-              </a:rPr>
-              <a:t>Total Transport 5Sv – 25Sv northwards</a:t>
-            </a:r>
-          </a:p>
+                <a:miter lim="800000"/>
+                <a:headEnd/>
+                <a:tailEnd/>
+              </a14:hiddenLine>
+            </a:ext>
+            <a:ext uri="{AF507438-7753-43e0-B8FC-AC1667EBCBE1}">
+              <a14:hiddenEffects xmlns:a14="http://schemas.microsoft.com/office/drawing/2010/main" xmlns="" xmlns:lc="http://schemas.openxmlformats.org/drawingml/2006/lockedCanvas">
+                <a:effectLst>
+                  <a:outerShdw dist="35921" dir="2700000" algn="ctr" rotWithShape="0">
+                    <a:schemeClr val="bg2"/>
+                  </a:outerShdw>
+                </a:effectLst>
+              </a14:hiddenEffects>
+            </a:ext>
+          </a:extLst>
+        </p:spPr>
+        <p:txBody>
+          <a:bodyPr vert="horz" wrap="square" lIns="0" tIns="0" rIns="0" bIns="0" numCol="1" anchor="t" anchorCtr="0" compatLnSpc="1">
+            <a:prstTxWarp prst="textNoShape">
+              <a:avLst/>
+            </a:prstTxWarp>
+          </a:bodyPr>
+          <a:lstStyle>
+            <a:lvl1pPr marL="0" indent="0" algn="l" rtl="0" eaLnBrk="1" fontAlgn="base" hangingPunct="1">
+              <a:spcBef>
+                <a:spcPct val="0"/>
+              </a:spcBef>
+              <a:spcAft>
+                <a:spcPct val="0"/>
+              </a:spcAft>
+              <a:buNone/>
+              <a:defRPr sz="1600">
+                <a:solidFill>
+                  <a:schemeClr val="tx1"/>
+                </a:solidFill>
+                <a:latin typeface="+mn-lt"/>
+                <a:ea typeface="+mn-ea"/>
+                <a:cs typeface="+mn-cs"/>
+              </a:defRPr>
+            </a:lvl1pPr>
+            <a:lvl2pPr marL="361950" indent="-177800" algn="l" rtl="0" eaLnBrk="1" fontAlgn="base" hangingPunct="1">
+              <a:spcBef>
+                <a:spcPct val="0"/>
+              </a:spcBef>
+              <a:spcAft>
+                <a:spcPct val="0"/>
+              </a:spcAft>
+              <a:buChar char="•"/>
+              <a:defRPr sz="1600">
+                <a:solidFill>
+                  <a:schemeClr val="tx1"/>
+                </a:solidFill>
+                <a:latin typeface="+mn-lt"/>
+                <a:cs typeface="+mn-cs"/>
+              </a:defRPr>
+            </a:lvl2pPr>
+            <a:lvl3pPr marL="541338" indent="-177800" algn="l" rtl="0" eaLnBrk="1" fontAlgn="base" hangingPunct="1">
+              <a:spcBef>
+                <a:spcPct val="0"/>
+              </a:spcBef>
+              <a:spcAft>
+                <a:spcPct val="0"/>
+              </a:spcAft>
+              <a:buChar char="•"/>
+              <a:defRPr sz="1600">
+                <a:solidFill>
+                  <a:schemeClr val="tx1"/>
+                </a:solidFill>
+                <a:latin typeface="+mn-lt"/>
+                <a:cs typeface="+mn-cs"/>
+              </a:defRPr>
+            </a:lvl3pPr>
+            <a:lvl4pPr marL="720725" indent="-177800" algn="l" rtl="0" eaLnBrk="1" fontAlgn="base" hangingPunct="1">
+              <a:spcBef>
+                <a:spcPct val="0"/>
+              </a:spcBef>
+              <a:spcAft>
+                <a:spcPct val="0"/>
+              </a:spcAft>
+              <a:buChar char="•"/>
+              <a:defRPr sz="1600">
+                <a:solidFill>
+                  <a:schemeClr val="tx1"/>
+                </a:solidFill>
+                <a:latin typeface="+mn-lt"/>
+                <a:cs typeface="+mn-cs"/>
+              </a:defRPr>
+            </a:lvl4pPr>
+            <a:lvl5pPr marL="900113" indent="-177800" algn="l" rtl="0" eaLnBrk="1" fontAlgn="base" hangingPunct="1">
+              <a:spcBef>
+                <a:spcPct val="0"/>
+              </a:spcBef>
+              <a:spcAft>
+                <a:spcPct val="0"/>
+              </a:spcAft>
+              <a:buChar char="•"/>
+              <a:defRPr sz="1600">
+                <a:solidFill>
+                  <a:schemeClr val="tx1"/>
+                </a:solidFill>
+                <a:latin typeface="+mn-lt"/>
+                <a:cs typeface="+mn-cs"/>
+              </a:defRPr>
+            </a:lvl5pPr>
+            <a:lvl6pPr marL="1357313" indent="-177800" algn="l" rtl="0" eaLnBrk="1" fontAlgn="base" hangingPunct="1">
+              <a:spcBef>
+                <a:spcPct val="0"/>
+              </a:spcBef>
+              <a:spcAft>
+                <a:spcPct val="0"/>
+              </a:spcAft>
+              <a:buChar char="•"/>
+              <a:defRPr>
+                <a:solidFill>
+                  <a:schemeClr val="tx1"/>
+                </a:solidFill>
+                <a:latin typeface="+mn-lt"/>
+                <a:cs typeface="+mn-cs"/>
+              </a:defRPr>
+            </a:lvl6pPr>
+            <a:lvl7pPr marL="1814513" indent="-177800" algn="l" rtl="0" eaLnBrk="1" fontAlgn="base" hangingPunct="1">
+              <a:spcBef>
+                <a:spcPct val="0"/>
+              </a:spcBef>
+              <a:spcAft>
+                <a:spcPct val="0"/>
+              </a:spcAft>
+              <a:buChar char="•"/>
+              <a:defRPr>
+                <a:solidFill>
+                  <a:schemeClr val="tx1"/>
+                </a:solidFill>
+                <a:latin typeface="+mn-lt"/>
+                <a:cs typeface="+mn-cs"/>
+              </a:defRPr>
+            </a:lvl7pPr>
+            <a:lvl8pPr marL="2271713" indent="-177800" algn="l" rtl="0" eaLnBrk="1" fontAlgn="base" hangingPunct="1">
+              <a:spcBef>
+                <a:spcPct val="0"/>
+              </a:spcBef>
+              <a:spcAft>
+                <a:spcPct val="0"/>
+              </a:spcAft>
+              <a:buChar char="•"/>
+              <a:defRPr>
+                <a:solidFill>
+                  <a:schemeClr val="tx1"/>
+                </a:solidFill>
+                <a:latin typeface="+mn-lt"/>
+                <a:cs typeface="+mn-cs"/>
+              </a:defRPr>
+            </a:lvl8pPr>
+            <a:lvl9pPr marL="2728913" indent="-177800" algn="l" rtl="0" eaLnBrk="1" fontAlgn="base" hangingPunct="1">
+              <a:spcBef>
+                <a:spcPct val="0"/>
+              </a:spcBef>
+              <a:spcAft>
+                <a:spcPct val="0"/>
+              </a:spcAft>
+              <a:buChar char="•"/>
+              <a:defRPr>
+                <a:solidFill>
+                  <a:schemeClr val="tx1"/>
+                </a:solidFill>
+                <a:latin typeface="+mn-lt"/>
+                <a:cs typeface="+mn-cs"/>
+              </a:defRPr>
+            </a:lvl9pPr>
+          </a:lstStyle>
           <a:p>
             <a:pPr marL="342900" indent="-342900">
               <a:spcBef>
@@ -29740,16 +29987,13 @@
               <a:buChar char="•"/>
             </a:pPr>
             <a:r>
-              <a:rPr lang="en-US" sz="2000" dirty="0"/>
-              <a:t>Strong seasonal cycle </a:t>
-            </a:r>
-            <a:r>
               <a:rPr lang="en-US" sz="2000" dirty="0">
-                <a:sym typeface="Wingdings" panose="05000000000000000000" pitchFamily="2" charset="2"/>
+                <a:solidFill>
+                  <a:schemeClr val="tx1"/>
+                </a:solidFill>
               </a:rPr>
-              <a:t> by Ekman Transport</a:t>
-            </a:r>
-            <a:endParaRPr lang="en-US" sz="2000" dirty="0"/>
+              <a:t>Total Transport 5Sv – 25Sv northwards</a:t>
+            </a:r>
           </a:p>
           <a:p>
             <a:pPr marL="342900" indent="-342900">
@@ -29760,12 +30004,32 @@
               <a:buChar char="•"/>
             </a:pPr>
             <a:r>
+              <a:rPr lang="en-US" sz="2000" dirty="0"/>
+              <a:t>Strong seasonal cycle </a:t>
+            </a:r>
+            <a:r>
+              <a:rPr lang="en-US" sz="2000" dirty="0">
+                <a:sym typeface="Wingdings" panose="05000000000000000000" pitchFamily="2" charset="2"/>
+              </a:rPr>
+              <a:t> by Ekman Transport</a:t>
+            </a:r>
+            <a:endParaRPr lang="en-US" sz="2000" dirty="0"/>
+          </a:p>
+          <a:p>
+            <a:pPr marL="342900" indent="-342900">
+              <a:spcBef>
+                <a:spcPts val="600"/>
+              </a:spcBef>
+              <a:buFont typeface="Arial" panose="020B0604020202020204" pitchFamily="34" charset="0"/>
+              <a:buChar char="•"/>
+            </a:pPr>
+            <a:r>
               <a:rPr lang="en-US" sz="2000" b="1" dirty="0">
                 <a:solidFill>
                   <a:srgbClr val="005AA0"/>
                 </a:solidFill>
               </a:rPr>
-              <a:t>Strong interannual variability even for smoothed data</a:t>
+              <a:t>Strong interannual variability even smoothed (similar to Bottom Pressure)</a:t>
             </a:r>
           </a:p>
         </p:txBody>
@@ -29773,7 +30037,7 @@
     </p:spTree>
     <p:extLst>
       <p:ext uri="{BB962C8B-B14F-4D97-AF65-F5344CB8AC3E}">
-        <p14:creationId xmlns:p14="http://schemas.microsoft.com/office/powerpoint/2010/main" val="2761930214"/>
+        <p14:creationId xmlns:p14="http://schemas.microsoft.com/office/powerpoint/2010/main" val="2484185018"/>
       </p:ext>
     </p:extLst>
   </p:cSld>

</xml_diff>